<commit_message>
Added updated ppt slides
</commit_message>
<xml_diff>
--- a/documentation/Minority_Report_Slides.pptx
+++ b/documentation/Minority_Report_Slides.pptx
@@ -21,13 +21,16 @@
     <p:sldId id="262" r:id="rId15"/>
     <p:sldId id="280" r:id="rId16"/>
     <p:sldId id="279" r:id="rId17"/>
-    <p:sldId id="273" r:id="rId18"/>
-    <p:sldId id="274" r:id="rId19"/>
-    <p:sldId id="275" r:id="rId20"/>
-    <p:sldId id="265" r:id="rId21"/>
-    <p:sldId id="276" r:id="rId22"/>
-    <p:sldId id="277" r:id="rId23"/>
-    <p:sldId id="278" r:id="rId24"/>
+    <p:sldId id="281" r:id="rId18"/>
+    <p:sldId id="282" r:id="rId19"/>
+    <p:sldId id="283" r:id="rId20"/>
+    <p:sldId id="273" r:id="rId21"/>
+    <p:sldId id="274" r:id="rId22"/>
+    <p:sldId id="275" r:id="rId23"/>
+    <p:sldId id="265" r:id="rId24"/>
+    <p:sldId id="276" r:id="rId25"/>
+    <p:sldId id="277" r:id="rId26"/>
+    <p:sldId id="278" r:id="rId27"/>
   </p:sldIdLst>
   <p:sldSz cx="12192000" cy="6858000"/>
   <p:notesSz cx="6858000" cy="9144000"/>
@@ -184,7 +187,7 @@
           <a:noFill/>
           <a:extLst>
             <a:ext uri="{909E8E84-426E-40dd-AFC4-6F175D3DCCD1}">
-              <a14:hiddenFill xmlns:a14="http://schemas.microsoft.com/office/drawing/2010/main" xmlns="">
+              <a14:hiddenFill xmlns="" xmlns:a14="http://schemas.microsoft.com/office/drawing/2010/main">
                 <a:solidFill>
                   <a:srgbClr val="FFFFFF"/>
                 </a:solidFill>
@@ -244,7 +247,7 @@
             </a:ln>
             <a:extLst>
               <a:ext uri="{91240B29-F687-4f45-9708-019B960494DF}">
-                <a14:hiddenLine xmlns:a14="http://schemas.microsoft.com/office/drawing/2010/main" xmlns="" w="9525">
+                <a14:hiddenLine xmlns="" xmlns:a14="http://schemas.microsoft.com/office/drawing/2010/main" w="9525">
                   <a:solidFill>
                     <a:srgbClr val="000000"/>
                   </a:solidFill>
@@ -334,7 +337,7 @@
             </a:ln>
             <a:extLst>
               <a:ext uri="{91240B29-F687-4f45-9708-019B960494DF}">
-                <a14:hiddenLine xmlns:a14="http://schemas.microsoft.com/office/drawing/2010/main" xmlns="" w="9525">
+                <a14:hiddenLine xmlns="" xmlns:a14="http://schemas.microsoft.com/office/drawing/2010/main" w="9525">
                   <a:solidFill>
                     <a:srgbClr val="000000"/>
                   </a:solidFill>
@@ -424,7 +427,7 @@
             </a:ln>
             <a:extLst>
               <a:ext uri="{91240B29-F687-4f45-9708-019B960494DF}">
-                <a14:hiddenLine xmlns:a14="http://schemas.microsoft.com/office/drawing/2010/main" xmlns="" w="9525">
+                <a14:hiddenLine xmlns="" xmlns:a14="http://schemas.microsoft.com/office/drawing/2010/main" w="9525">
                   <a:solidFill>
                     <a:srgbClr val="000000"/>
                   </a:solidFill>
@@ -458,7 +461,7 @@
             </a:ln>
             <a:extLst>
               <a:ext uri="{91240B29-F687-4f45-9708-019B960494DF}">
-                <a14:hiddenLine xmlns:a14="http://schemas.microsoft.com/office/drawing/2010/main" xmlns="" w="9525">
+                <a14:hiddenLine xmlns="" xmlns:a14="http://schemas.microsoft.com/office/drawing/2010/main" w="9525">
                   <a:solidFill>
                     <a:srgbClr val="000000"/>
                   </a:solidFill>
@@ -548,7 +551,7 @@
             </a:ln>
             <a:extLst>
               <a:ext uri="{91240B29-F687-4f45-9708-019B960494DF}">
-                <a14:hiddenLine xmlns:a14="http://schemas.microsoft.com/office/drawing/2010/main" xmlns="" w="9525">
+                <a14:hiddenLine xmlns="" xmlns:a14="http://schemas.microsoft.com/office/drawing/2010/main" w="9525">
                   <a:solidFill>
                     <a:srgbClr val="000000"/>
                   </a:solidFill>
@@ -610,7 +613,7 @@
             </a:ln>
             <a:extLst>
               <a:ext uri="{91240B29-F687-4f45-9708-019B960494DF}">
-                <a14:hiddenLine xmlns:a14="http://schemas.microsoft.com/office/drawing/2010/main" xmlns="" w="9525">
+                <a14:hiddenLine xmlns="" xmlns:a14="http://schemas.microsoft.com/office/drawing/2010/main" w="9525">
                   <a:solidFill>
                     <a:srgbClr val="000000"/>
                   </a:solidFill>
@@ -672,7 +675,7 @@
             </a:ln>
             <a:extLst>
               <a:ext uri="{91240B29-F687-4f45-9708-019B960494DF}">
-                <a14:hiddenLine xmlns:a14="http://schemas.microsoft.com/office/drawing/2010/main" xmlns="" w="9525">
+                <a14:hiddenLine xmlns="" xmlns:a14="http://schemas.microsoft.com/office/drawing/2010/main" w="9525">
                   <a:solidFill>
                     <a:srgbClr val="000000"/>
                   </a:solidFill>
@@ -762,7 +765,7 @@
             </a:ln>
             <a:extLst>
               <a:ext uri="{91240B29-F687-4f45-9708-019B960494DF}">
-                <a14:hiddenLine xmlns:a14="http://schemas.microsoft.com/office/drawing/2010/main" xmlns="" w="9525">
+                <a14:hiddenLine xmlns="" xmlns:a14="http://schemas.microsoft.com/office/drawing/2010/main" w="9525">
                   <a:solidFill>
                     <a:srgbClr val="000000"/>
                   </a:solidFill>
@@ -824,7 +827,7 @@
             </a:ln>
             <a:extLst>
               <a:ext uri="{91240B29-F687-4f45-9708-019B960494DF}">
-                <a14:hiddenLine xmlns:a14="http://schemas.microsoft.com/office/drawing/2010/main" xmlns="" w="9525">
+                <a14:hiddenLine xmlns="" xmlns:a14="http://schemas.microsoft.com/office/drawing/2010/main" w="9525">
                   <a:solidFill>
                     <a:srgbClr val="000000"/>
                   </a:solidFill>
@@ -886,7 +889,7 @@
             </a:ln>
             <a:extLst>
               <a:ext uri="{91240B29-F687-4f45-9708-019B960494DF}">
-                <a14:hiddenLine xmlns:a14="http://schemas.microsoft.com/office/drawing/2010/main" xmlns="" w="9525">
+                <a14:hiddenLine xmlns="" xmlns:a14="http://schemas.microsoft.com/office/drawing/2010/main" w="9525">
                   <a:solidFill>
                     <a:srgbClr val="000000"/>
                   </a:solidFill>
@@ -976,7 +979,7 @@
             </a:ln>
             <a:extLst>
               <a:ext uri="{91240B29-F687-4f45-9708-019B960494DF}">
-                <a14:hiddenLine xmlns:a14="http://schemas.microsoft.com/office/drawing/2010/main" xmlns="" w="9525">
+                <a14:hiddenLine xmlns="" xmlns:a14="http://schemas.microsoft.com/office/drawing/2010/main" w="9525">
                   <a:solidFill>
                     <a:srgbClr val="000000"/>
                   </a:solidFill>
@@ -1066,7 +1069,7 @@
             </a:ln>
             <a:extLst>
               <a:ext uri="{91240B29-F687-4f45-9708-019B960494DF}">
-                <a14:hiddenLine xmlns:a14="http://schemas.microsoft.com/office/drawing/2010/main" xmlns="" w="9525">
+                <a14:hiddenLine xmlns="" xmlns:a14="http://schemas.microsoft.com/office/drawing/2010/main" w="9525">
                   <a:solidFill>
                     <a:srgbClr val="000000"/>
                   </a:solidFill>
@@ -1128,7 +1131,7 @@
             </a:ln>
             <a:extLst>
               <a:ext uri="{91240B29-F687-4f45-9708-019B960494DF}">
-                <a14:hiddenLine xmlns:a14="http://schemas.microsoft.com/office/drawing/2010/main" xmlns="" w="9525">
+                <a14:hiddenLine xmlns="" xmlns:a14="http://schemas.microsoft.com/office/drawing/2010/main" w="9525">
                   <a:solidFill>
                     <a:srgbClr val="000000"/>
                   </a:solidFill>
@@ -1238,7 +1241,7 @@
             </a:ln>
             <a:extLst>
               <a:ext uri="{91240B29-F687-4f45-9708-019B960494DF}">
-                <a14:hiddenLine xmlns:a14="http://schemas.microsoft.com/office/drawing/2010/main" xmlns="" w="9525">
+                <a14:hiddenLine xmlns="" xmlns:a14="http://schemas.microsoft.com/office/drawing/2010/main" w="9525">
                   <a:solidFill>
                     <a:srgbClr val="000000"/>
                   </a:solidFill>
@@ -1300,7 +1303,7 @@
             </a:ln>
             <a:extLst>
               <a:ext uri="{91240B29-F687-4f45-9708-019B960494DF}">
-                <a14:hiddenLine xmlns:a14="http://schemas.microsoft.com/office/drawing/2010/main" xmlns="" w="9525">
+                <a14:hiddenLine xmlns="" xmlns:a14="http://schemas.microsoft.com/office/drawing/2010/main" w="9525">
                   <a:solidFill>
                     <a:srgbClr val="000000"/>
                   </a:solidFill>
@@ -1390,7 +1393,7 @@
             </a:ln>
             <a:extLst>
               <a:ext uri="{91240B29-F687-4f45-9708-019B960494DF}">
-                <a14:hiddenLine xmlns:a14="http://schemas.microsoft.com/office/drawing/2010/main" xmlns="" w="9525">
+                <a14:hiddenLine xmlns="" xmlns:a14="http://schemas.microsoft.com/office/drawing/2010/main" w="9525">
                   <a:solidFill>
                     <a:srgbClr val="000000"/>
                   </a:solidFill>
@@ -1480,7 +1483,7 @@
             </a:ln>
             <a:extLst>
               <a:ext uri="{91240B29-F687-4f45-9708-019B960494DF}">
-                <a14:hiddenLine xmlns:a14="http://schemas.microsoft.com/office/drawing/2010/main" xmlns="" w="9525">
+                <a14:hiddenLine xmlns="" xmlns:a14="http://schemas.microsoft.com/office/drawing/2010/main" w="9525">
                   <a:solidFill>
                     <a:srgbClr val="000000"/>
                   </a:solidFill>
@@ -1542,7 +1545,7 @@
             </a:ln>
             <a:extLst>
               <a:ext uri="{91240B29-F687-4f45-9708-019B960494DF}">
-                <a14:hiddenLine xmlns:a14="http://schemas.microsoft.com/office/drawing/2010/main" xmlns="" w="9525">
+                <a14:hiddenLine xmlns="" xmlns:a14="http://schemas.microsoft.com/office/drawing/2010/main" w="9525">
                   <a:solidFill>
                     <a:srgbClr val="000000"/>
                   </a:solidFill>
@@ -1632,7 +1635,7 @@
             </a:ln>
             <a:extLst>
               <a:ext uri="{91240B29-F687-4f45-9708-019B960494DF}">
-                <a14:hiddenLine xmlns:a14="http://schemas.microsoft.com/office/drawing/2010/main" xmlns="" w="9525">
+                <a14:hiddenLine xmlns="" xmlns:a14="http://schemas.microsoft.com/office/drawing/2010/main" w="9525">
                   <a:solidFill>
                     <a:srgbClr val="000000"/>
                   </a:solidFill>
@@ -1722,7 +1725,7 @@
             </a:ln>
             <a:extLst>
               <a:ext uri="{91240B29-F687-4f45-9708-019B960494DF}">
-                <a14:hiddenLine xmlns:a14="http://schemas.microsoft.com/office/drawing/2010/main" xmlns="" w="9525">
+                <a14:hiddenLine xmlns="" xmlns:a14="http://schemas.microsoft.com/office/drawing/2010/main" w="9525">
                   <a:solidFill>
                     <a:srgbClr val="000000"/>
                   </a:solidFill>
@@ -1778,7 +1781,7 @@
             </a:ln>
             <a:extLst>
               <a:ext uri="{91240B29-F687-4f45-9708-019B960494DF}">
-                <a14:hiddenLine xmlns:a14="http://schemas.microsoft.com/office/drawing/2010/main" xmlns="" w="9525">
+                <a14:hiddenLine xmlns="" xmlns:a14="http://schemas.microsoft.com/office/drawing/2010/main" w="9525">
                   <a:solidFill>
                     <a:srgbClr val="000000"/>
                   </a:solidFill>
@@ -1868,7 +1871,7 @@
             </a:ln>
             <a:extLst>
               <a:ext uri="{91240B29-F687-4f45-9708-019B960494DF}">
-                <a14:hiddenLine xmlns:a14="http://schemas.microsoft.com/office/drawing/2010/main" xmlns="" w="9525">
+                <a14:hiddenLine xmlns="" xmlns:a14="http://schemas.microsoft.com/office/drawing/2010/main" w="9525">
                   <a:solidFill>
                     <a:srgbClr val="000000"/>
                   </a:solidFill>
@@ -1924,7 +1927,7 @@
             </a:ln>
             <a:extLst>
               <a:ext uri="{91240B29-F687-4f45-9708-019B960494DF}">
-                <a14:hiddenLine xmlns:a14="http://schemas.microsoft.com/office/drawing/2010/main" xmlns="" w="9525">
+                <a14:hiddenLine xmlns="" xmlns:a14="http://schemas.microsoft.com/office/drawing/2010/main" w="9525">
                   <a:solidFill>
                     <a:srgbClr val="000000"/>
                   </a:solidFill>
@@ -2014,7 +2017,7 @@
             </a:ln>
             <a:extLst>
               <a:ext uri="{91240B29-F687-4f45-9708-019B960494DF}">
-                <a14:hiddenLine xmlns:a14="http://schemas.microsoft.com/office/drawing/2010/main" xmlns="" w="9525">
+                <a14:hiddenLine xmlns="" xmlns:a14="http://schemas.microsoft.com/office/drawing/2010/main" w="9525">
                   <a:solidFill>
                     <a:srgbClr val="000000"/>
                   </a:solidFill>
@@ -2082,7 +2085,7 @@
             </a:ln>
             <a:extLst>
               <a:ext uri="{91240B29-F687-4f45-9708-019B960494DF}">
-                <a14:hiddenLine xmlns:a14="http://schemas.microsoft.com/office/drawing/2010/main" xmlns="" w="9525">
+                <a14:hiddenLine xmlns="" xmlns:a14="http://schemas.microsoft.com/office/drawing/2010/main" w="9525">
                   <a:solidFill>
                     <a:srgbClr val="000000"/>
                   </a:solidFill>
@@ -2172,7 +2175,7 @@
             </a:ln>
             <a:extLst>
               <a:ext uri="{91240B29-F687-4f45-9708-019B960494DF}">
-                <a14:hiddenLine xmlns:a14="http://schemas.microsoft.com/office/drawing/2010/main" xmlns="" w="9525">
+                <a14:hiddenLine xmlns="" xmlns:a14="http://schemas.microsoft.com/office/drawing/2010/main" w="9525">
                   <a:solidFill>
                     <a:srgbClr val="000000"/>
                   </a:solidFill>
@@ -2240,7 +2243,7 @@
             </a:ln>
             <a:extLst>
               <a:ext uri="{91240B29-F687-4f45-9708-019B960494DF}">
-                <a14:hiddenLine xmlns:a14="http://schemas.microsoft.com/office/drawing/2010/main" xmlns="" w="9525">
+                <a14:hiddenLine xmlns="" xmlns:a14="http://schemas.microsoft.com/office/drawing/2010/main" w="9525">
                   <a:solidFill>
                     <a:srgbClr val="000000"/>
                   </a:solidFill>
@@ -2330,7 +2333,7 @@
             </a:ln>
             <a:extLst>
               <a:ext uri="{91240B29-F687-4f45-9708-019B960494DF}">
-                <a14:hiddenLine xmlns:a14="http://schemas.microsoft.com/office/drawing/2010/main" xmlns="" w="9525">
+                <a14:hiddenLine xmlns="" xmlns:a14="http://schemas.microsoft.com/office/drawing/2010/main" w="9525">
                   <a:solidFill>
                     <a:srgbClr val="000000"/>
                   </a:solidFill>
@@ -2364,7 +2367,7 @@
             </a:ln>
             <a:extLst>
               <a:ext uri="{91240B29-F687-4f45-9708-019B960494DF}">
-                <a14:hiddenLine xmlns:a14="http://schemas.microsoft.com/office/drawing/2010/main" xmlns="" w="9525">
+                <a14:hiddenLine xmlns="" xmlns:a14="http://schemas.microsoft.com/office/drawing/2010/main" w="9525">
                   <a:solidFill>
                     <a:srgbClr val="000000"/>
                   </a:solidFill>
@@ -2454,7 +2457,7 @@
             </a:ln>
             <a:extLst>
               <a:ext uri="{91240B29-F687-4f45-9708-019B960494DF}">
-                <a14:hiddenLine xmlns:a14="http://schemas.microsoft.com/office/drawing/2010/main" xmlns="" w="9525">
+                <a14:hiddenLine xmlns="" xmlns:a14="http://schemas.microsoft.com/office/drawing/2010/main" w="9525">
                   <a:solidFill>
                     <a:srgbClr val="000000"/>
                   </a:solidFill>
@@ -2516,7 +2519,7 @@
             </a:ln>
             <a:extLst>
               <a:ext uri="{91240B29-F687-4f45-9708-019B960494DF}">
-                <a14:hiddenLine xmlns:a14="http://schemas.microsoft.com/office/drawing/2010/main" xmlns="" w="9525">
+                <a14:hiddenLine xmlns="" xmlns:a14="http://schemas.microsoft.com/office/drawing/2010/main" w="9525">
                   <a:solidFill>
                     <a:srgbClr val="000000"/>
                   </a:solidFill>
@@ -2578,7 +2581,7 @@
             </a:ln>
             <a:extLst>
               <a:ext uri="{91240B29-F687-4f45-9708-019B960494DF}">
-                <a14:hiddenLine xmlns:a14="http://schemas.microsoft.com/office/drawing/2010/main" xmlns="" w="9525">
+                <a14:hiddenLine xmlns="" xmlns:a14="http://schemas.microsoft.com/office/drawing/2010/main" w="9525">
                   <a:solidFill>
                     <a:srgbClr val="000000"/>
                   </a:solidFill>
@@ -2668,7 +2671,7 @@
             </a:ln>
             <a:extLst>
               <a:ext uri="{91240B29-F687-4f45-9708-019B960494DF}">
-                <a14:hiddenLine xmlns:a14="http://schemas.microsoft.com/office/drawing/2010/main" xmlns="" w="9525">
+                <a14:hiddenLine xmlns="" xmlns:a14="http://schemas.microsoft.com/office/drawing/2010/main" w="9525">
                   <a:solidFill>
                     <a:srgbClr val="000000"/>
                   </a:solidFill>
@@ -2736,7 +2739,7 @@
             </a:ln>
             <a:extLst>
               <a:ext uri="{91240B29-F687-4f45-9708-019B960494DF}">
-                <a14:hiddenLine xmlns:a14="http://schemas.microsoft.com/office/drawing/2010/main" xmlns="" w="9525">
+                <a14:hiddenLine xmlns="" xmlns:a14="http://schemas.microsoft.com/office/drawing/2010/main" w="9525">
                   <a:solidFill>
                     <a:srgbClr val="000000"/>
                   </a:solidFill>
@@ -2798,7 +2801,7 @@
             </a:ln>
             <a:extLst>
               <a:ext uri="{91240B29-F687-4f45-9708-019B960494DF}">
-                <a14:hiddenLine xmlns:a14="http://schemas.microsoft.com/office/drawing/2010/main" xmlns="" w="9525">
+                <a14:hiddenLine xmlns="" xmlns:a14="http://schemas.microsoft.com/office/drawing/2010/main" w="9525">
                   <a:solidFill>
                     <a:srgbClr val="000000"/>
                   </a:solidFill>
@@ -2888,7 +2891,7 @@
             </a:ln>
             <a:extLst>
               <a:ext uri="{91240B29-F687-4f45-9708-019B960494DF}">
-                <a14:hiddenLine xmlns:a14="http://schemas.microsoft.com/office/drawing/2010/main" xmlns="" w="9525">
+                <a14:hiddenLine xmlns="" xmlns:a14="http://schemas.microsoft.com/office/drawing/2010/main" w="9525">
                   <a:solidFill>
                     <a:srgbClr val="000000"/>
                   </a:solidFill>
@@ -2950,7 +2953,7 @@
             </a:ln>
             <a:extLst>
               <a:ext uri="{91240B29-F687-4f45-9708-019B960494DF}">
-                <a14:hiddenLine xmlns:a14="http://schemas.microsoft.com/office/drawing/2010/main" xmlns="" w="9525">
+                <a14:hiddenLine xmlns="" xmlns:a14="http://schemas.microsoft.com/office/drawing/2010/main" w="9525">
                   <a:solidFill>
                     <a:srgbClr val="000000"/>
                   </a:solidFill>
@@ -3040,7 +3043,7 @@
             </a:ln>
             <a:extLst>
               <a:ext uri="{91240B29-F687-4f45-9708-019B960494DF}">
-                <a14:hiddenLine xmlns:a14="http://schemas.microsoft.com/office/drawing/2010/main" xmlns="" w="9525">
+                <a14:hiddenLine xmlns="" xmlns:a14="http://schemas.microsoft.com/office/drawing/2010/main" w="9525">
                   <a:solidFill>
                     <a:srgbClr val="000000"/>
                   </a:solidFill>
@@ -3102,7 +3105,7 @@
             </a:ln>
             <a:extLst>
               <a:ext uri="{91240B29-F687-4f45-9708-019B960494DF}">
-                <a14:hiddenLine xmlns:a14="http://schemas.microsoft.com/office/drawing/2010/main" xmlns="" w="9525">
+                <a14:hiddenLine xmlns="" xmlns:a14="http://schemas.microsoft.com/office/drawing/2010/main" w="9525">
                   <a:solidFill>
                     <a:srgbClr val="000000"/>
                   </a:solidFill>
@@ -3192,7 +3195,7 @@
             </a:ln>
             <a:extLst>
               <a:ext uri="{91240B29-F687-4f45-9708-019B960494DF}">
-                <a14:hiddenLine xmlns:a14="http://schemas.microsoft.com/office/drawing/2010/main" xmlns="" w="9525">
+                <a14:hiddenLine xmlns="" xmlns:a14="http://schemas.microsoft.com/office/drawing/2010/main" w="9525">
                   <a:solidFill>
                     <a:srgbClr val="000000"/>
                   </a:solidFill>
@@ -3226,7 +3229,7 @@
             </a:ln>
             <a:extLst>
               <a:ext uri="{91240B29-F687-4f45-9708-019B960494DF}">
-                <a14:hiddenLine xmlns:a14="http://schemas.microsoft.com/office/drawing/2010/main" xmlns="" w="9525">
+                <a14:hiddenLine xmlns="" xmlns:a14="http://schemas.microsoft.com/office/drawing/2010/main" w="9525">
                   <a:solidFill>
                     <a:srgbClr val="000000"/>
                   </a:solidFill>
@@ -3291,7 +3294,7 @@
             </a:ln>
             <a:extLst>
               <a:ext uri="{91240B29-F687-4f45-9708-019B960494DF}">
-                <a14:hiddenLine xmlns:a14="http://schemas.microsoft.com/office/drawing/2010/main" xmlns="" w="9525">
+                <a14:hiddenLine xmlns="" xmlns:a14="http://schemas.microsoft.com/office/drawing/2010/main" w="9525">
                   <a:solidFill>
                     <a:srgbClr val="000000"/>
                   </a:solidFill>
@@ -3381,7 +3384,7 @@
             </a:ln>
             <a:extLst>
               <a:ext uri="{91240B29-F687-4f45-9708-019B960494DF}">
-                <a14:hiddenLine xmlns:a14="http://schemas.microsoft.com/office/drawing/2010/main" xmlns="" w="9525">
+                <a14:hiddenLine xmlns="" xmlns:a14="http://schemas.microsoft.com/office/drawing/2010/main" w="9525">
                   <a:solidFill>
                     <a:srgbClr val="000000"/>
                   </a:solidFill>
@@ -3443,7 +3446,7 @@
             </a:ln>
             <a:extLst>
               <a:ext uri="{91240B29-F687-4f45-9708-019B960494DF}">
-                <a14:hiddenLine xmlns:a14="http://schemas.microsoft.com/office/drawing/2010/main" xmlns="" w="9525">
+                <a14:hiddenLine xmlns="" xmlns:a14="http://schemas.microsoft.com/office/drawing/2010/main" w="9525">
                   <a:solidFill>
                     <a:srgbClr val="000000"/>
                   </a:solidFill>
@@ -3533,7 +3536,7 @@
             </a:ln>
             <a:extLst>
               <a:ext uri="{91240B29-F687-4f45-9708-019B960494DF}">
-                <a14:hiddenLine xmlns:a14="http://schemas.microsoft.com/office/drawing/2010/main" xmlns="" w="9525">
+                <a14:hiddenLine xmlns="" xmlns:a14="http://schemas.microsoft.com/office/drawing/2010/main" w="9525">
                   <a:solidFill>
                     <a:srgbClr val="000000"/>
                   </a:solidFill>
@@ -3623,7 +3626,7 @@
             </a:ln>
             <a:extLst>
               <a:ext uri="{91240B29-F687-4f45-9708-019B960494DF}">
-                <a14:hiddenLine xmlns:a14="http://schemas.microsoft.com/office/drawing/2010/main" xmlns="" w="9525">
+                <a14:hiddenLine xmlns="" xmlns:a14="http://schemas.microsoft.com/office/drawing/2010/main" w="9525">
                   <a:solidFill>
                     <a:srgbClr val="000000"/>
                   </a:solidFill>
@@ -3688,7 +3691,7 @@
             </a:ln>
             <a:extLst>
               <a:ext uri="{91240B29-F687-4f45-9708-019B960494DF}">
-                <a14:hiddenLine xmlns:a14="http://schemas.microsoft.com/office/drawing/2010/main" xmlns="" w="9525">
+                <a14:hiddenLine xmlns="" xmlns:a14="http://schemas.microsoft.com/office/drawing/2010/main" w="9525">
                   <a:solidFill>
                     <a:srgbClr val="000000"/>
                   </a:solidFill>
@@ -3750,7 +3753,7 @@
             </a:ln>
             <a:extLst>
               <a:ext uri="{91240B29-F687-4f45-9708-019B960494DF}">
-                <a14:hiddenLine xmlns:a14="http://schemas.microsoft.com/office/drawing/2010/main" xmlns="" w="9525">
+                <a14:hiddenLine xmlns="" xmlns:a14="http://schemas.microsoft.com/office/drawing/2010/main" w="9525">
                   <a:solidFill>
                     <a:srgbClr val="000000"/>
                   </a:solidFill>
@@ -3840,7 +3843,7 @@
             </a:ln>
             <a:extLst>
               <a:ext uri="{91240B29-F687-4f45-9708-019B960494DF}">
-                <a14:hiddenLine xmlns:a14="http://schemas.microsoft.com/office/drawing/2010/main" xmlns="" w="9525">
+                <a14:hiddenLine xmlns="" xmlns:a14="http://schemas.microsoft.com/office/drawing/2010/main" w="9525">
                   <a:solidFill>
                     <a:srgbClr val="000000"/>
                   </a:solidFill>
@@ -3930,7 +3933,7 @@
             </a:ln>
             <a:extLst>
               <a:ext uri="{91240B29-F687-4f45-9708-019B960494DF}">
-                <a14:hiddenLine xmlns:a14="http://schemas.microsoft.com/office/drawing/2010/main" xmlns="" w="9525">
+                <a14:hiddenLine xmlns="" xmlns:a14="http://schemas.microsoft.com/office/drawing/2010/main" w="9525">
                   <a:solidFill>
                     <a:srgbClr val="000000"/>
                   </a:solidFill>
@@ -3992,7 +3995,7 @@
             </a:ln>
             <a:extLst>
               <a:ext uri="{91240B29-F687-4f45-9708-019B960494DF}">
-                <a14:hiddenLine xmlns:a14="http://schemas.microsoft.com/office/drawing/2010/main" xmlns="" w="9525">
+                <a14:hiddenLine xmlns="" xmlns:a14="http://schemas.microsoft.com/office/drawing/2010/main" w="9525">
                   <a:solidFill>
                     <a:srgbClr val="000000"/>
                   </a:solidFill>
@@ -4112,7 +4115,7 @@
             </a:ln>
             <a:extLst>
               <a:ext uri="{91240B29-F687-4f45-9708-019B960494DF}">
-                <a14:hiddenLine xmlns:a14="http://schemas.microsoft.com/office/drawing/2010/main" xmlns="" w="9525">
+                <a14:hiddenLine xmlns="" xmlns:a14="http://schemas.microsoft.com/office/drawing/2010/main" w="9525">
                   <a:solidFill>
                     <a:srgbClr val="000000"/>
                   </a:solidFill>
@@ -4180,7 +4183,7 @@
             </a:ln>
             <a:extLst>
               <a:ext uri="{91240B29-F687-4f45-9708-019B960494DF}">
-                <a14:hiddenLine xmlns:a14="http://schemas.microsoft.com/office/drawing/2010/main" xmlns="" w="9525">
+                <a14:hiddenLine xmlns="" xmlns:a14="http://schemas.microsoft.com/office/drawing/2010/main" w="9525">
                   <a:solidFill>
                     <a:srgbClr val="000000"/>
                   </a:solidFill>
@@ -4270,7 +4273,7 @@
             </a:ln>
             <a:extLst>
               <a:ext uri="{91240B29-F687-4f45-9708-019B960494DF}">
-                <a14:hiddenLine xmlns:a14="http://schemas.microsoft.com/office/drawing/2010/main" xmlns="" w="9525">
+                <a14:hiddenLine xmlns="" xmlns:a14="http://schemas.microsoft.com/office/drawing/2010/main" w="9525">
                   <a:solidFill>
                     <a:srgbClr val="000000"/>
                   </a:solidFill>
@@ -4410,7 +4413,7 @@
           <a:p>
             <a:fld id="{48A87A34-81AB-432B-8DAE-1953F412C126}" type="datetimeFigureOut">
               <a:rPr lang="en-US" dirty="0"/>
-              <a:t>5/7/2023</a:t>
+              <a:t>5/8/2023</a:t>
             </a:fld>
             <a:endParaRPr lang="en-US" dirty="0"/>
           </a:p>
@@ -4672,7 +4675,7 @@
           <a:p>
             <a:fld id="{48A87A34-81AB-432B-8DAE-1953F412C126}" type="datetimeFigureOut">
               <a:rPr lang="en-US" dirty="0"/>
-              <a:t>5/7/2023</a:t>
+              <a:t>5/8/2023</a:t>
             </a:fld>
             <a:endParaRPr lang="en-US" dirty="0"/>
           </a:p>
@@ -4863,7 +4866,7 @@
           <a:p>
             <a:fld id="{48A87A34-81AB-432B-8DAE-1953F412C126}" type="datetimeFigureOut">
               <a:rPr lang="en-US" dirty="0"/>
-              <a:t>5/7/2023</a:t>
+              <a:t>5/8/2023</a:t>
             </a:fld>
             <a:endParaRPr lang="en-US" dirty="0"/>
           </a:p>
@@ -5121,7 +5124,7 @@
           <a:p>
             <a:fld id="{48A87A34-81AB-432B-8DAE-1953F412C126}" type="datetimeFigureOut">
               <a:rPr lang="en-US" dirty="0"/>
-              <a:t>5/7/2023</a:t>
+              <a:t>5/8/2023</a:t>
             </a:fld>
             <a:endParaRPr lang="en-US" dirty="0"/>
           </a:p>
@@ -5550,7 +5553,7 @@
           <a:p>
             <a:fld id="{48A87A34-81AB-432B-8DAE-1953F412C126}" type="datetimeFigureOut">
               <a:rPr lang="en-US" dirty="0"/>
-              <a:t>5/7/2023</a:t>
+              <a:t>5/8/2023</a:t>
             </a:fld>
             <a:endParaRPr lang="en-US" dirty="0"/>
           </a:p>
@@ -6091,7 +6094,7 @@
           <a:p>
             <a:fld id="{48A87A34-81AB-432B-8DAE-1953F412C126}" type="datetimeFigureOut">
               <a:rPr lang="en-US" dirty="0"/>
-              <a:t>5/7/2023</a:t>
+              <a:t>5/8/2023</a:t>
             </a:fld>
             <a:endParaRPr lang="en-US" dirty="0"/>
           </a:p>
@@ -6806,7 +6809,7 @@
           <a:p>
             <a:fld id="{48A87A34-81AB-432B-8DAE-1953F412C126}" type="datetimeFigureOut">
               <a:rPr lang="en-US" dirty="0"/>
-              <a:t>5/7/2023</a:t>
+              <a:t>5/8/2023</a:t>
             </a:fld>
             <a:endParaRPr lang="en-US" dirty="0"/>
           </a:p>
@@ -6971,7 +6974,7 @@
           <a:p>
             <a:fld id="{48A87A34-81AB-432B-8DAE-1953F412C126}" type="datetimeFigureOut">
               <a:rPr lang="en-US" dirty="0"/>
-              <a:t>5/7/2023</a:t>
+              <a:t>5/8/2023</a:t>
             </a:fld>
             <a:endParaRPr lang="en-US" dirty="0"/>
           </a:p>
@@ -7146,7 +7149,7 @@
           <a:p>
             <a:fld id="{48A87A34-81AB-432B-8DAE-1953F412C126}" type="datetimeFigureOut">
               <a:rPr lang="en-US" dirty="0"/>
-              <a:t>5/7/2023</a:t>
+              <a:t>5/8/2023</a:t>
             </a:fld>
             <a:endParaRPr lang="en-US" dirty="0"/>
           </a:p>
@@ -7311,7 +7314,7 @@
           <a:p>
             <a:fld id="{48A87A34-81AB-432B-8DAE-1953F412C126}" type="datetimeFigureOut">
               <a:rPr lang="en-US" dirty="0"/>
-              <a:t>5/7/2023</a:t>
+              <a:t>5/8/2023</a:t>
             </a:fld>
             <a:endParaRPr lang="en-US" dirty="0"/>
           </a:p>
@@ -7556,7 +7559,7 @@
           <a:p>
             <a:fld id="{48A87A34-81AB-432B-8DAE-1953F412C126}" type="datetimeFigureOut">
               <a:rPr lang="en-US" dirty="0"/>
-              <a:t>5/7/2023</a:t>
+              <a:t>5/8/2023</a:t>
             </a:fld>
             <a:endParaRPr lang="en-US" dirty="0"/>
           </a:p>
@@ -7783,7 +7786,7 @@
           <a:p>
             <a:fld id="{48A87A34-81AB-432B-8DAE-1953F412C126}" type="datetimeFigureOut">
               <a:rPr lang="en-US" dirty="0"/>
-              <a:t>5/7/2023</a:t>
+              <a:t>5/8/2023</a:t>
             </a:fld>
             <a:endParaRPr lang="en-US" dirty="0"/>
           </a:p>
@@ -8159,7 +8162,7 @@
           <a:p>
             <a:fld id="{48A87A34-81AB-432B-8DAE-1953F412C126}" type="datetimeFigureOut">
               <a:rPr lang="en-US" dirty="0"/>
-              <a:t>5/7/2023</a:t>
+              <a:t>5/8/2023</a:t>
             </a:fld>
             <a:endParaRPr lang="en-US" dirty="0"/>
           </a:p>
@@ -8272,7 +8275,7 @@
           <a:p>
             <a:fld id="{48A87A34-81AB-432B-8DAE-1953F412C126}" type="datetimeFigureOut">
               <a:rPr lang="en-US" dirty="0"/>
-              <a:t>5/7/2023</a:t>
+              <a:t>5/8/2023</a:t>
             </a:fld>
             <a:endParaRPr lang="en-US" dirty="0"/>
           </a:p>
@@ -8362,7 +8365,7 @@
           <a:p>
             <a:fld id="{48A87A34-81AB-432B-8DAE-1953F412C126}" type="datetimeFigureOut">
               <a:rPr lang="en-US" dirty="0"/>
-              <a:t>5/7/2023</a:t>
+              <a:t>5/8/2023</a:t>
             </a:fld>
             <a:endParaRPr lang="en-US" dirty="0"/>
           </a:p>
@@ -8606,7 +8609,7 @@
           <a:p>
             <a:fld id="{48A87A34-81AB-432B-8DAE-1953F412C126}" type="datetimeFigureOut">
               <a:rPr lang="en-US" dirty="0"/>
-              <a:t>5/7/2023</a:t>
+              <a:t>5/8/2023</a:t>
             </a:fld>
             <a:endParaRPr lang="en-US" dirty="0"/>
           </a:p>
@@ -8881,7 +8884,7 @@
           <a:p>
             <a:fld id="{48A87A34-81AB-432B-8DAE-1953F412C126}" type="datetimeFigureOut">
               <a:rPr lang="en-US" dirty="0"/>
-              <a:t>5/7/2023</a:t>
+              <a:t>5/8/2023</a:t>
             </a:fld>
             <a:endParaRPr lang="en-US" dirty="0"/>
           </a:p>
@@ -8992,7 +8995,7 @@
           <a:noFill/>
           <a:extLst>
             <a:ext uri="{909E8E84-426E-40dd-AFC4-6F175D3DCCD1}">
-              <a14:hiddenFill xmlns:a14="http://schemas.microsoft.com/office/drawing/2010/main" xmlns="">
+              <a14:hiddenFill xmlns="" xmlns:a14="http://schemas.microsoft.com/office/drawing/2010/main">
                 <a:solidFill>
                   <a:srgbClr val="FFFFFF"/>
                 </a:solidFill>
@@ -9066,7 +9069,7 @@
               </a:ln>
               <a:extLst>
                 <a:ext uri="{91240B29-F687-4f45-9708-019B960494DF}">
-                  <a14:hiddenLine xmlns:a14="http://schemas.microsoft.com/office/drawing/2010/main" xmlns="" w="9525">
+                  <a14:hiddenLine xmlns="" xmlns:a14="http://schemas.microsoft.com/office/drawing/2010/main" w="9525">
                     <a:solidFill>
                       <a:srgbClr val="000000"/>
                     </a:solidFill>
@@ -9156,7 +9159,7 @@
               </a:ln>
               <a:extLst>
                 <a:ext uri="{91240B29-F687-4f45-9708-019B960494DF}">
-                  <a14:hiddenLine xmlns:a14="http://schemas.microsoft.com/office/drawing/2010/main" xmlns="" w="9525">
+                  <a14:hiddenLine xmlns="" xmlns:a14="http://schemas.microsoft.com/office/drawing/2010/main" w="9525">
                     <a:solidFill>
                       <a:srgbClr val="000000"/>
                     </a:solidFill>
@@ -9246,7 +9249,7 @@
               </a:ln>
               <a:extLst>
                 <a:ext uri="{91240B29-F687-4f45-9708-019B960494DF}">
-                  <a14:hiddenLine xmlns:a14="http://schemas.microsoft.com/office/drawing/2010/main" xmlns="" w="9525">
+                  <a14:hiddenLine xmlns="" xmlns:a14="http://schemas.microsoft.com/office/drawing/2010/main" w="9525">
                     <a:solidFill>
                       <a:srgbClr val="000000"/>
                     </a:solidFill>
@@ -9308,7 +9311,7 @@
               </a:ln>
               <a:extLst>
                 <a:ext uri="{91240B29-F687-4f45-9708-019B960494DF}">
-                  <a14:hiddenLine xmlns:a14="http://schemas.microsoft.com/office/drawing/2010/main" xmlns="" w="9525">
+                  <a14:hiddenLine xmlns="" xmlns:a14="http://schemas.microsoft.com/office/drawing/2010/main" w="9525">
                     <a:solidFill>
                       <a:srgbClr val="000000"/>
                     </a:solidFill>
@@ -9398,7 +9401,7 @@
               </a:ln>
               <a:extLst>
                 <a:ext uri="{91240B29-F687-4f45-9708-019B960494DF}">
-                  <a14:hiddenLine xmlns:a14="http://schemas.microsoft.com/office/drawing/2010/main" xmlns="" w="9525">
+                  <a14:hiddenLine xmlns="" xmlns:a14="http://schemas.microsoft.com/office/drawing/2010/main" w="9525">
                     <a:solidFill>
                       <a:srgbClr val="000000"/>
                     </a:solidFill>
@@ -9460,7 +9463,7 @@
               </a:ln>
               <a:extLst>
                 <a:ext uri="{91240B29-F687-4f45-9708-019B960494DF}">
-                  <a14:hiddenLine xmlns:a14="http://schemas.microsoft.com/office/drawing/2010/main" xmlns="" w="9525">
+                  <a14:hiddenLine xmlns="" xmlns:a14="http://schemas.microsoft.com/office/drawing/2010/main" w="9525">
                     <a:solidFill>
                       <a:srgbClr val="000000"/>
                     </a:solidFill>
@@ -9522,7 +9525,7 @@
               </a:ln>
               <a:extLst>
                 <a:ext uri="{91240B29-F687-4f45-9708-019B960494DF}">
-                  <a14:hiddenLine xmlns:a14="http://schemas.microsoft.com/office/drawing/2010/main" xmlns="" w="9525">
+                  <a14:hiddenLine xmlns="" xmlns:a14="http://schemas.microsoft.com/office/drawing/2010/main" w="9525">
                     <a:solidFill>
                       <a:srgbClr val="000000"/>
                     </a:solidFill>
@@ -9612,7 +9615,7 @@
               </a:ln>
               <a:extLst>
                 <a:ext uri="{91240B29-F687-4f45-9708-019B960494DF}">
-                  <a14:hiddenLine xmlns:a14="http://schemas.microsoft.com/office/drawing/2010/main" xmlns="" w="9525">
+                  <a14:hiddenLine xmlns="" xmlns:a14="http://schemas.microsoft.com/office/drawing/2010/main" w="9525">
                     <a:solidFill>
                       <a:srgbClr val="000000"/>
                     </a:solidFill>
@@ -9702,7 +9705,7 @@
               </a:ln>
               <a:extLst>
                 <a:ext uri="{91240B29-F687-4f45-9708-019B960494DF}">
-                  <a14:hiddenLine xmlns:a14="http://schemas.microsoft.com/office/drawing/2010/main" xmlns="" w="9525">
+                  <a14:hiddenLine xmlns="" xmlns:a14="http://schemas.microsoft.com/office/drawing/2010/main" w="9525">
                     <a:solidFill>
                       <a:srgbClr val="000000"/>
                     </a:solidFill>
@@ -9764,7 +9767,7 @@
               </a:ln>
               <a:extLst>
                 <a:ext uri="{91240B29-F687-4f45-9708-019B960494DF}">
-                  <a14:hiddenLine xmlns:a14="http://schemas.microsoft.com/office/drawing/2010/main" xmlns="" w="9525">
+                  <a14:hiddenLine xmlns="" xmlns:a14="http://schemas.microsoft.com/office/drawing/2010/main" w="9525">
                     <a:solidFill>
                       <a:srgbClr val="000000"/>
                     </a:solidFill>
@@ -9874,7 +9877,7 @@
               </a:ln>
               <a:extLst>
                 <a:ext uri="{91240B29-F687-4f45-9708-019B960494DF}">
-                  <a14:hiddenLine xmlns:a14="http://schemas.microsoft.com/office/drawing/2010/main" xmlns="" w="9525">
+                  <a14:hiddenLine xmlns="" xmlns:a14="http://schemas.microsoft.com/office/drawing/2010/main" w="9525">
                     <a:solidFill>
                       <a:srgbClr val="000000"/>
                     </a:solidFill>
@@ -9958,7 +9961,7 @@
               </a:ln>
               <a:extLst>
                 <a:ext uri="{91240B29-F687-4f45-9708-019B960494DF}">
-                  <a14:hiddenLine xmlns:a14="http://schemas.microsoft.com/office/drawing/2010/main" xmlns="" w="9525">
+                  <a14:hiddenLine xmlns="" xmlns:a14="http://schemas.microsoft.com/office/drawing/2010/main" w="9525">
                     <a:solidFill>
                       <a:srgbClr val="000000"/>
                     </a:solidFill>
@@ -10020,7 +10023,7 @@
               </a:ln>
               <a:extLst>
                 <a:ext uri="{91240B29-F687-4f45-9708-019B960494DF}">
-                  <a14:hiddenLine xmlns:a14="http://schemas.microsoft.com/office/drawing/2010/main" xmlns="" w="9525">
+                  <a14:hiddenLine xmlns="" xmlns:a14="http://schemas.microsoft.com/office/drawing/2010/main" w="9525">
                     <a:solidFill>
                       <a:srgbClr val="000000"/>
                     </a:solidFill>
@@ -10082,7 +10085,7 @@
               </a:ln>
               <a:extLst>
                 <a:ext uri="{91240B29-F687-4f45-9708-019B960494DF}">
-                  <a14:hiddenLine xmlns:a14="http://schemas.microsoft.com/office/drawing/2010/main" xmlns="" w="9525">
+                  <a14:hiddenLine xmlns="" xmlns:a14="http://schemas.microsoft.com/office/drawing/2010/main" w="9525">
                     <a:solidFill>
                       <a:srgbClr val="000000"/>
                     </a:solidFill>
@@ -10172,7 +10175,7 @@
               </a:ln>
               <a:extLst>
                 <a:ext uri="{91240B29-F687-4f45-9708-019B960494DF}">
-                  <a14:hiddenLine xmlns:a14="http://schemas.microsoft.com/office/drawing/2010/main" xmlns="" w="9525">
+                  <a14:hiddenLine xmlns="" xmlns:a14="http://schemas.microsoft.com/office/drawing/2010/main" w="9525">
                     <a:solidFill>
                       <a:srgbClr val="000000"/>
                     </a:solidFill>
@@ -10206,7 +10209,7 @@
               </a:ln>
               <a:extLst>
                 <a:ext uri="{91240B29-F687-4f45-9708-019B960494DF}">
-                  <a14:hiddenLine xmlns:a14="http://schemas.microsoft.com/office/drawing/2010/main" xmlns="" w="9525">
+                  <a14:hiddenLine xmlns="" xmlns:a14="http://schemas.microsoft.com/office/drawing/2010/main" w="9525">
                     <a:solidFill>
                       <a:srgbClr val="000000"/>
                     </a:solidFill>
@@ -10271,7 +10274,7 @@
               </a:ln>
               <a:extLst>
                 <a:ext uri="{91240B29-F687-4f45-9708-019B960494DF}">
-                  <a14:hiddenLine xmlns:a14="http://schemas.microsoft.com/office/drawing/2010/main" xmlns="" w="9525">
+                  <a14:hiddenLine xmlns="" xmlns:a14="http://schemas.microsoft.com/office/drawing/2010/main" w="9525">
                     <a:solidFill>
                       <a:srgbClr val="000000"/>
                     </a:solidFill>
@@ -10361,7 +10364,7 @@
               </a:ln>
               <a:extLst>
                 <a:ext uri="{91240B29-F687-4f45-9708-019B960494DF}">
-                  <a14:hiddenLine xmlns:a14="http://schemas.microsoft.com/office/drawing/2010/main" xmlns="" w="9525">
+                  <a14:hiddenLine xmlns="" xmlns:a14="http://schemas.microsoft.com/office/drawing/2010/main" w="9525">
                     <a:solidFill>
                       <a:srgbClr val="000000"/>
                     </a:solidFill>
@@ -10423,7 +10426,7 @@
               </a:ln>
               <a:extLst>
                 <a:ext uri="{91240B29-F687-4f45-9708-019B960494DF}">
-                  <a14:hiddenLine xmlns:a14="http://schemas.microsoft.com/office/drawing/2010/main" xmlns="" w="9525">
+                  <a14:hiddenLine xmlns="" xmlns:a14="http://schemas.microsoft.com/office/drawing/2010/main" w="9525">
                     <a:solidFill>
                       <a:srgbClr val="000000"/>
                     </a:solidFill>
@@ -10513,7 +10516,7 @@
               </a:ln>
               <a:extLst>
                 <a:ext uri="{91240B29-F687-4f45-9708-019B960494DF}">
-                  <a14:hiddenLine xmlns:a14="http://schemas.microsoft.com/office/drawing/2010/main" xmlns="" w="9525">
+                  <a14:hiddenLine xmlns="" xmlns:a14="http://schemas.microsoft.com/office/drawing/2010/main" w="9525">
                     <a:solidFill>
                       <a:srgbClr val="000000"/>
                     </a:solidFill>
@@ -10578,7 +10581,7 @@
               </a:ln>
               <a:extLst>
                 <a:ext uri="{91240B29-F687-4f45-9708-019B960494DF}">
-                  <a14:hiddenLine xmlns:a14="http://schemas.microsoft.com/office/drawing/2010/main" xmlns="" w="9525">
+                  <a14:hiddenLine xmlns="" xmlns:a14="http://schemas.microsoft.com/office/drawing/2010/main" w="9525">
                     <a:solidFill>
                       <a:srgbClr val="000000"/>
                     </a:solidFill>
@@ -10640,7 +10643,7 @@
               </a:ln>
               <a:extLst>
                 <a:ext uri="{91240B29-F687-4f45-9708-019B960494DF}">
-                  <a14:hiddenLine xmlns:a14="http://schemas.microsoft.com/office/drawing/2010/main" xmlns="" w="9525">
+                  <a14:hiddenLine xmlns="" xmlns:a14="http://schemas.microsoft.com/office/drawing/2010/main" w="9525">
                     <a:solidFill>
                       <a:srgbClr val="000000"/>
                     </a:solidFill>
@@ -10730,7 +10733,7 @@
               </a:ln>
               <a:extLst>
                 <a:ext uri="{91240B29-F687-4f45-9708-019B960494DF}">
-                  <a14:hiddenLine xmlns:a14="http://schemas.microsoft.com/office/drawing/2010/main" xmlns="" w="9525">
+                  <a14:hiddenLine xmlns="" xmlns:a14="http://schemas.microsoft.com/office/drawing/2010/main" w="9525">
                     <a:solidFill>
                       <a:srgbClr val="000000"/>
                     </a:solidFill>
@@ -10820,7 +10823,7 @@
               </a:ln>
               <a:extLst>
                 <a:ext uri="{91240B29-F687-4f45-9708-019B960494DF}">
-                  <a14:hiddenLine xmlns:a14="http://schemas.microsoft.com/office/drawing/2010/main" xmlns="" w="9525">
+                  <a14:hiddenLine xmlns="" xmlns:a14="http://schemas.microsoft.com/office/drawing/2010/main" w="9525">
                     <a:solidFill>
                       <a:srgbClr val="000000"/>
                     </a:solidFill>
@@ -10885,7 +10888,7 @@
               </a:ln>
               <a:extLst>
                 <a:ext uri="{91240B29-F687-4f45-9708-019B960494DF}">
-                  <a14:hiddenLine xmlns:a14="http://schemas.microsoft.com/office/drawing/2010/main" xmlns="" w="9525">
+                  <a14:hiddenLine xmlns="" xmlns:a14="http://schemas.microsoft.com/office/drawing/2010/main" w="9525">
                     <a:solidFill>
                       <a:srgbClr val="000000"/>
                     </a:solidFill>
@@ -11005,7 +11008,7 @@
               </a:ln>
               <a:extLst>
                 <a:ext uri="{91240B29-F687-4f45-9708-019B960494DF}">
-                  <a14:hiddenLine xmlns:a14="http://schemas.microsoft.com/office/drawing/2010/main" xmlns="" w="9525">
+                  <a14:hiddenLine xmlns="" xmlns:a14="http://schemas.microsoft.com/office/drawing/2010/main" w="9525">
                     <a:solidFill>
                       <a:srgbClr val="000000"/>
                     </a:solidFill>
@@ -11103,7 +11106,7 @@
               </a:ln>
               <a:extLst>
                 <a:ext uri="{91240B29-F687-4f45-9708-019B960494DF}">
-                  <a14:hiddenLine xmlns:a14="http://schemas.microsoft.com/office/drawing/2010/main" xmlns="" w="9525">
+                  <a14:hiddenLine xmlns="" xmlns:a14="http://schemas.microsoft.com/office/drawing/2010/main" w="9525">
                     <a:solidFill>
                       <a:srgbClr val="000000"/>
                     </a:solidFill>
@@ -11218,7 +11221,7 @@
               </a:ln>
               <a:extLst>
                 <a:ext uri="{91240B29-F687-4f45-9708-019B960494DF}">
-                  <a14:hiddenLine xmlns:a14="http://schemas.microsoft.com/office/drawing/2010/main" xmlns="" w="9525">
+                  <a14:hiddenLine xmlns="" xmlns:a14="http://schemas.microsoft.com/office/drawing/2010/main" w="9525">
                     <a:solidFill>
                       <a:srgbClr val="000000"/>
                     </a:solidFill>
@@ -11308,7 +11311,7 @@
               </a:ln>
               <a:extLst>
                 <a:ext uri="{91240B29-F687-4f45-9708-019B960494DF}">
-                  <a14:hiddenLine xmlns:a14="http://schemas.microsoft.com/office/drawing/2010/main" xmlns="" w="9525">
+                  <a14:hiddenLine xmlns="" xmlns:a14="http://schemas.microsoft.com/office/drawing/2010/main" w="9525">
                     <a:solidFill>
                       <a:srgbClr val="000000"/>
                     </a:solidFill>
@@ -11373,7 +11376,7 @@
               </a:ln>
               <a:extLst>
                 <a:ext uri="{91240B29-F687-4f45-9708-019B960494DF}">
-                  <a14:hiddenLine xmlns:a14="http://schemas.microsoft.com/office/drawing/2010/main" xmlns="" w="9525">
+                  <a14:hiddenLine xmlns="" xmlns:a14="http://schemas.microsoft.com/office/drawing/2010/main" w="9525">
                     <a:solidFill>
                       <a:srgbClr val="000000"/>
                     </a:solidFill>
@@ -11463,7 +11466,7 @@
               </a:ln>
               <a:extLst>
                 <a:ext uri="{91240B29-F687-4f45-9708-019B960494DF}">
-                  <a14:hiddenLine xmlns:a14="http://schemas.microsoft.com/office/drawing/2010/main" xmlns="" w="9525">
+                  <a14:hiddenLine xmlns="" xmlns:a14="http://schemas.microsoft.com/office/drawing/2010/main" w="9525">
                     <a:solidFill>
                       <a:srgbClr val="000000"/>
                     </a:solidFill>
@@ -11531,7 +11534,7 @@
               </a:ln>
               <a:extLst>
                 <a:ext uri="{91240B29-F687-4f45-9708-019B960494DF}">
-                  <a14:hiddenLine xmlns:a14="http://schemas.microsoft.com/office/drawing/2010/main" xmlns="" w="9525">
+                  <a14:hiddenLine xmlns="" xmlns:a14="http://schemas.microsoft.com/office/drawing/2010/main" w="9525">
                     <a:solidFill>
                       <a:srgbClr val="000000"/>
                     </a:solidFill>
@@ -11621,7 +11624,7 @@
               </a:ln>
               <a:extLst>
                 <a:ext uri="{91240B29-F687-4f45-9708-019B960494DF}">
-                  <a14:hiddenLine xmlns:a14="http://schemas.microsoft.com/office/drawing/2010/main" xmlns="" w="9525">
+                  <a14:hiddenLine xmlns="" xmlns:a14="http://schemas.microsoft.com/office/drawing/2010/main" w="9525">
                     <a:solidFill>
                       <a:srgbClr val="000000"/>
                     </a:solidFill>
@@ -11689,7 +11692,7 @@
               </a:ln>
               <a:extLst>
                 <a:ext uri="{91240B29-F687-4f45-9708-019B960494DF}">
-                  <a14:hiddenLine xmlns:a14="http://schemas.microsoft.com/office/drawing/2010/main" xmlns="" w="9525">
+                  <a14:hiddenLine xmlns="" xmlns:a14="http://schemas.microsoft.com/office/drawing/2010/main" w="9525">
                     <a:solidFill>
                       <a:srgbClr val="000000"/>
                     </a:solidFill>
@@ -11779,7 +11782,7 @@
               </a:ln>
               <a:extLst>
                 <a:ext uri="{91240B29-F687-4f45-9708-019B960494DF}">
-                  <a14:hiddenLine xmlns:a14="http://schemas.microsoft.com/office/drawing/2010/main" xmlns="" w="9525">
+                  <a14:hiddenLine xmlns="" xmlns:a14="http://schemas.microsoft.com/office/drawing/2010/main" w="9525">
                     <a:solidFill>
                       <a:srgbClr val="000000"/>
                     </a:solidFill>
@@ -11813,7 +11816,7 @@
               </a:ln>
               <a:extLst>
                 <a:ext uri="{91240B29-F687-4f45-9708-019B960494DF}">
-                  <a14:hiddenLine xmlns:a14="http://schemas.microsoft.com/office/drawing/2010/main" xmlns="" w="9525">
+                  <a14:hiddenLine xmlns="" xmlns:a14="http://schemas.microsoft.com/office/drawing/2010/main" w="9525">
                     <a:solidFill>
                       <a:srgbClr val="000000"/>
                     </a:solidFill>
@@ -11954,7 +11957,7 @@
             <a:fld id="{48A87A34-81AB-432B-8DAE-1953F412C126}" type="datetimeFigureOut">
               <a:rPr lang="en-US" dirty="0"/>
               <a:pPr/>
-              <a:t>5/7/2023</a:t>
+              <a:t>5/8/2023</a:t>
             </a:fld>
             <a:endParaRPr lang="en-US" dirty="0"/>
           </a:p>
@@ -13692,7 +13695,7 @@
           <p:cNvPr id="2" name="Title 1">
             <a:extLst>
               <a:ext uri="{FF2B5EF4-FFF2-40B4-BE49-F238E27FC236}">
-                <a16:creationId xmlns:a16="http://schemas.microsoft.com/office/drawing/2014/main" id="{F13FAE68-28BD-FDB8-ECD4-42B0E540231D}"/>
+                <a16:creationId xmlns:a16="http://schemas.microsoft.com/office/drawing/2014/main" id="{03367D28-7416-FCDC-A481-795D989E52B6}"/>
               </a:ext>
             </a:extLst>
           </p:cNvPr>
@@ -13710,55 +13713,556 @@
           <a:p>
             <a:r>
               <a:rPr lang="en-US" dirty="0"/>
-              <a:t>Method(Jim)</a:t>
+              <a:t>Method(Shafiullah)</a:t>
             </a:r>
           </a:p>
         </p:txBody>
       </p:sp>
-      <p:sp>
-        <p:nvSpPr>
-          <p:cNvPr id="3" name="Content Placeholder 2">
-            <a:extLst>
-              <a:ext uri="{FF2B5EF4-FFF2-40B4-BE49-F238E27FC236}">
-                <a16:creationId xmlns:a16="http://schemas.microsoft.com/office/drawing/2014/main" id="{865172AC-459B-C91B-696F-3B5B51FAC074}"/>
-              </a:ext>
-            </a:extLst>
-          </p:cNvPr>
-          <p:cNvSpPr>
-            <a:spLocks noGrp="1"/>
-          </p:cNvSpPr>
-          <p:nvPr>
-            <p:ph idx="1"/>
-          </p:nvPr>
-        </p:nvSpPr>
-        <p:spPr/>
-        <p:txBody>
-          <a:bodyPr/>
-          <a:lstStyle/>
-          <a:p>
-            <a:r>
-              <a:rPr lang="en-US" dirty="0"/>
-              <a:t>Similar to Chris, I analyzed two data sets.</a:t>
-            </a:r>
-          </a:p>
-          <a:p>
-            <a:r>
-              <a:rPr lang="en-US" dirty="0"/>
-              <a:t>The first was simulated data set from Human Resources Diversity Analysis.</a:t>
-            </a:r>
-          </a:p>
-          <a:p>
-            <a:r>
-              <a:rPr lang="en-US" dirty="0"/>
-              <a:t>The second was from Levels FYI.</a:t>
-            </a:r>
-          </a:p>
-        </p:txBody>
-      </p:sp>
+      <mc:AlternateContent xmlns:mc="http://schemas.openxmlformats.org/markup-compatibility/2006">
+        <mc:Choice xmlns:a14="http://schemas.microsoft.com/office/drawing/2010/main" Requires="a14">
+          <p:sp>
+            <p:nvSpPr>
+              <p:cNvPr id="3" name="Content Placeholder 2">
+                <a:extLst>
+                  <a:ext uri="{FF2B5EF4-FFF2-40B4-BE49-F238E27FC236}">
+                    <a16:creationId xmlns:a16="http://schemas.microsoft.com/office/drawing/2014/main" id="{CC18753D-B20E-721B-3C71-59E3ABF29640}"/>
+                  </a:ext>
+                </a:extLst>
+              </p:cNvPr>
+              <p:cNvSpPr>
+                <a:spLocks noGrp="1"/>
+              </p:cNvSpPr>
+              <p:nvPr>
+                <p:ph idx="1"/>
+              </p:nvPr>
+            </p:nvSpPr>
+            <p:spPr/>
+            <p:txBody>
+              <a:bodyPr>
+                <a:normAutofit fontScale="92500"/>
+              </a:bodyPr>
+              <a:lstStyle/>
+              <a:p>
+                <a:r>
+                  <a:rPr lang="en-US" dirty="0"/>
+                  <a:t>I analyzed two datasets that were related to one another</a:t>
+                </a:r>
+              </a:p>
+              <a:p>
+                <a:r>
+                  <a:rPr lang="en-US" dirty="0"/>
+                  <a:t>I used Linear Regression Model and KNN to determine discrepancies between male and female employment. </a:t>
+                </a:r>
+              </a:p>
+              <a:p>
+                <a:r>
+                  <a:rPr lang="en-US" dirty="0"/>
+                  <a:t>The data set was examined using the K-nearest neighbors classification</a:t>
+                </a:r>
+              </a:p>
+              <a:p>
+                <a:pPr marL="0" indent="0">
+                  <a:buNone/>
+                </a:pPr>
+                <a14:m>
+                  <m:oMathPara xmlns:m="http://schemas.openxmlformats.org/officeDocument/2006/math">
+                    <m:oMathParaPr>
+                      <m:jc m:val="centerGroup"/>
+                    </m:oMathParaPr>
+                    <m:oMath xmlns:m="http://schemas.openxmlformats.org/officeDocument/2006/math">
+                      <m:acc>
+                        <m:accPr>
+                          <m:chr m:val="̂"/>
+                          <m:ctrlPr>
+                            <a:rPr lang="es-ES" i="1" smtClean="0">
+                              <a:latin typeface="Cambria Math" panose="02040503050406030204" pitchFamily="18" charset="0"/>
+                            </a:rPr>
+                          </m:ctrlPr>
+                        </m:accPr>
+                        <m:e>
+                          <m:r>
+                            <a:rPr lang="es-ES" i="1">
+                              <a:latin typeface="Cambria Math" panose="02040503050406030204" pitchFamily="18" charset="0"/>
+                            </a:rPr>
+                            <m:t>𝑦</m:t>
+                          </m:r>
+                        </m:e>
+                      </m:acc>
+                      <m:r>
+                        <a:rPr lang="es-ES" i="1">
+                          <a:latin typeface="Cambria Math" panose="02040503050406030204" pitchFamily="18" charset="0"/>
+                        </a:rPr>
+                        <m:t>=</m:t>
+                      </m:r>
+                      <m:r>
+                        <a:rPr lang="es-ES" i="1">
+                          <a:latin typeface="Cambria Math" panose="02040503050406030204" pitchFamily="18" charset="0"/>
+                        </a:rPr>
+                        <m:t>𝑓</m:t>
+                      </m:r>
+                      <m:d>
+                        <m:dPr>
+                          <m:ctrlPr>
+                            <a:rPr lang="es-ES" i="1">
+                              <a:latin typeface="Cambria Math" panose="02040503050406030204" pitchFamily="18" charset="0"/>
+                            </a:rPr>
+                          </m:ctrlPr>
+                        </m:dPr>
+                        <m:e>
+                          <m:r>
+                            <a:rPr lang="es-ES" i="1">
+                              <a:latin typeface="Cambria Math" panose="02040503050406030204" pitchFamily="18" charset="0"/>
+                            </a:rPr>
+                            <m:t>𝑥</m:t>
+                          </m:r>
+                        </m:e>
+                      </m:d>
+                      <m:r>
+                        <a:rPr lang="es-ES" i="1">
+                          <a:latin typeface="Cambria Math" panose="02040503050406030204" pitchFamily="18" charset="0"/>
+                        </a:rPr>
+                        <m:t>=</m:t>
+                      </m:r>
+                      <m:sSub>
+                        <m:sSubPr>
+                          <m:ctrlPr>
+                            <a:rPr lang="es-ES" i="1">
+                              <a:latin typeface="Cambria Math" panose="02040503050406030204" pitchFamily="18" charset="0"/>
+                            </a:rPr>
+                          </m:ctrlPr>
+                        </m:sSubPr>
+                        <m:e>
+                          <m:r>
+                            <a:rPr lang="es-ES" i="1">
+                              <a:latin typeface="Cambria Math" panose="02040503050406030204" pitchFamily="18" charset="0"/>
+                            </a:rPr>
+                            <m:t>𝑦</m:t>
+                          </m:r>
+                        </m:e>
+                        <m:sub>
+                          <m:r>
+                            <a:rPr lang="es-ES" i="1">
+                              <a:latin typeface="Cambria Math" panose="02040503050406030204" pitchFamily="18" charset="0"/>
+                            </a:rPr>
+                            <m:t>𝑛𝑛</m:t>
+                          </m:r>
+                        </m:sub>
+                      </m:sSub>
+                      <m:d>
+                        <m:dPr>
+                          <m:ctrlPr>
+                            <a:rPr lang="es-ES" i="1">
+                              <a:latin typeface="Cambria Math" panose="02040503050406030204" pitchFamily="18" charset="0"/>
+                            </a:rPr>
+                          </m:ctrlPr>
+                        </m:dPr>
+                        <m:e>
+                          <m:r>
+                            <a:rPr lang="es-ES" i="1">
+                              <a:latin typeface="Cambria Math" panose="02040503050406030204" pitchFamily="18" charset="0"/>
+                            </a:rPr>
+                            <m:t>𝑥</m:t>
+                          </m:r>
+                        </m:e>
+                      </m:d>
+                    </m:oMath>
+                  </m:oMathPara>
+                </a14:m>
+                <a:endParaRPr lang="en-US" dirty="0"/>
+              </a:p>
+              <a:p>
+                <a:pPr marL="0" indent="0">
+                  <a:buNone/>
+                </a:pPr>
+                <a14:m>
+                  <m:oMathPara xmlns:m="http://schemas.openxmlformats.org/officeDocument/2006/math">
+                    <m:oMathParaPr>
+                      <m:jc m:val="centerGroup"/>
+                    </m:oMathParaPr>
+                    <m:oMath xmlns:m="http://schemas.openxmlformats.org/officeDocument/2006/math">
+                      <m:r>
+                        <a:rPr lang="en-US" i="1" smtClean="0">
+                          <a:latin typeface="Cambria Math" panose="02040503050406030204" pitchFamily="18" charset="0"/>
+                        </a:rPr>
+                        <m:t>𝑛𝑛</m:t>
+                      </m:r>
+                      <m:d>
+                        <m:dPr>
+                          <m:ctrlPr>
+                            <a:rPr lang="en-US" i="1">
+                              <a:latin typeface="Cambria Math" panose="02040503050406030204" pitchFamily="18" charset="0"/>
+                            </a:rPr>
+                          </m:ctrlPr>
+                        </m:dPr>
+                        <m:e>
+                          <m:r>
+                            <a:rPr lang="en-US" i="1">
+                              <a:latin typeface="Cambria Math" panose="02040503050406030204" pitchFamily="18" charset="0"/>
+                            </a:rPr>
+                            <m:t>𝑥</m:t>
+                          </m:r>
+                        </m:e>
+                      </m:d>
+                      <m:r>
+                        <a:rPr lang="en-US" i="1">
+                          <a:latin typeface="Cambria Math" panose="02040503050406030204" pitchFamily="18" charset="0"/>
+                        </a:rPr>
+                        <m:t>=</m:t>
+                      </m:r>
+                      <m:r>
+                        <a:rPr lang="en-US" i="1">
+                          <a:latin typeface="Cambria Math" panose="02040503050406030204" pitchFamily="18" charset="0"/>
+                        </a:rPr>
+                        <m:t>𝑎𝑟𝑔𝑚𝑖</m:t>
+                      </m:r>
+                      <m:sSub>
+                        <m:sSubPr>
+                          <m:ctrlPr>
+                            <a:rPr lang="en-US" i="1">
+                              <a:latin typeface="Cambria Math" panose="02040503050406030204" pitchFamily="18" charset="0"/>
+                            </a:rPr>
+                          </m:ctrlPr>
+                        </m:sSubPr>
+                        <m:e>
+                          <m:r>
+                            <a:rPr lang="en-US" i="1">
+                              <a:latin typeface="Cambria Math" panose="02040503050406030204" pitchFamily="18" charset="0"/>
+                            </a:rPr>
+                            <m:t>𝑛</m:t>
+                          </m:r>
+                        </m:e>
+                        <m:sub>
+                          <m:r>
+                            <a:rPr lang="en-US" i="1">
+                              <a:latin typeface="Cambria Math" panose="02040503050406030204" pitchFamily="18" charset="0"/>
+                            </a:rPr>
+                            <m:t>𝑛</m:t>
+                          </m:r>
+                          <m:r>
+                            <a:rPr lang="en-US" i="1">
+                              <a:latin typeface="Cambria Math" panose="02040503050406030204" pitchFamily="18" charset="0"/>
+                            </a:rPr>
+                            <m:t>=1,…,</m:t>
+                          </m:r>
+                          <m:r>
+                            <a:rPr lang="en-US" i="1">
+                              <a:latin typeface="Cambria Math" panose="02040503050406030204" pitchFamily="18" charset="0"/>
+                            </a:rPr>
+                            <m:t>𝑁</m:t>
+                          </m:r>
+                        </m:sub>
+                      </m:sSub>
+                      <m:sSubSup>
+                        <m:sSubSupPr>
+                          <m:ctrlPr>
+                            <a:rPr lang="en-US" i="1">
+                              <a:latin typeface="Cambria Math" panose="02040503050406030204" pitchFamily="18" charset="0"/>
+                            </a:rPr>
+                          </m:ctrlPr>
+                        </m:sSubSupPr>
+                        <m:e>
+                          <m:d>
+                            <m:dPr>
+                              <m:begChr m:val="|"/>
+                              <m:endChr m:val="|"/>
+                              <m:ctrlPr>
+                                <a:rPr lang="en-US" i="1">
+                                  <a:latin typeface="Cambria Math" panose="02040503050406030204" pitchFamily="18" charset="0"/>
+                                </a:rPr>
+                              </m:ctrlPr>
+                            </m:dPr>
+                            <m:e>
+                              <m:d>
+                                <m:dPr>
+                                  <m:begChr m:val="|"/>
+                                  <m:endChr m:val="|"/>
+                                  <m:ctrlPr>
+                                    <a:rPr lang="en-US" i="1">
+                                      <a:latin typeface="Cambria Math" panose="02040503050406030204" pitchFamily="18" charset="0"/>
+                                    </a:rPr>
+                                  </m:ctrlPr>
+                                </m:dPr>
+                                <m:e>
+                                  <m:r>
+                                    <a:rPr lang="en-US" i="1">
+                                      <a:latin typeface="Cambria Math" panose="02040503050406030204" pitchFamily="18" charset="0"/>
+                                    </a:rPr>
+                                    <m:t>𝑥</m:t>
+                                  </m:r>
+                                  <m:r>
+                                    <a:rPr lang="en-US" i="1">
+                                      <a:latin typeface="Cambria Math" panose="02040503050406030204" pitchFamily="18" charset="0"/>
+                                    </a:rPr>
+                                    <m:t>−</m:t>
+                                  </m:r>
+                                  <m:sSub>
+                                    <m:sSubPr>
+                                      <m:ctrlPr>
+                                        <a:rPr lang="en-US" i="1">
+                                          <a:latin typeface="Cambria Math" panose="02040503050406030204" pitchFamily="18" charset="0"/>
+                                        </a:rPr>
+                                      </m:ctrlPr>
+                                    </m:sSubPr>
+                                    <m:e>
+                                      <m:r>
+                                        <a:rPr lang="en-US" i="1">
+                                          <a:latin typeface="Cambria Math" panose="02040503050406030204" pitchFamily="18" charset="0"/>
+                                        </a:rPr>
+                                        <m:t>𝑥</m:t>
+                                      </m:r>
+                                    </m:e>
+                                    <m:sub>
+                                      <m:r>
+                                        <a:rPr lang="en-US" i="1">
+                                          <a:latin typeface="Cambria Math" panose="02040503050406030204" pitchFamily="18" charset="0"/>
+                                        </a:rPr>
+                                        <m:t>𝑛</m:t>
+                                      </m:r>
+                                    </m:sub>
+                                  </m:sSub>
+                                </m:e>
+                              </m:d>
+                            </m:e>
+                          </m:d>
+                        </m:e>
+                        <m:sub>
+                          <m:r>
+                            <a:rPr lang="en-US" i="1">
+                              <a:latin typeface="Cambria Math" panose="02040503050406030204" pitchFamily="18" charset="0"/>
+                            </a:rPr>
+                            <m:t>2</m:t>
+                          </m:r>
+                        </m:sub>
+                        <m:sup>
+                          <m:r>
+                            <a:rPr lang="en-US" i="1">
+                              <a:latin typeface="Cambria Math" panose="02040503050406030204" pitchFamily="18" charset="0"/>
+                            </a:rPr>
+                            <m:t>2</m:t>
+                          </m:r>
+                        </m:sup>
+                      </m:sSubSup>
+                      <m:r>
+                        <a:rPr lang="en-US" i="1">
+                          <a:latin typeface="Cambria Math" panose="02040503050406030204" pitchFamily="18" charset="0"/>
+                        </a:rPr>
+                        <m:t>=</m:t>
+                      </m:r>
+                      <m:r>
+                        <a:rPr lang="en-US" i="1">
+                          <a:latin typeface="Cambria Math" panose="02040503050406030204" pitchFamily="18" charset="0"/>
+                        </a:rPr>
+                        <m:t>𝑎𝑟𝑔𝑚𝑖</m:t>
+                      </m:r>
+                      <m:sSub>
+                        <m:sSubPr>
+                          <m:ctrlPr>
+                            <a:rPr lang="en-US" i="1">
+                              <a:latin typeface="Cambria Math" panose="02040503050406030204" pitchFamily="18" charset="0"/>
+                            </a:rPr>
+                          </m:ctrlPr>
+                        </m:sSubPr>
+                        <m:e>
+                          <m:r>
+                            <a:rPr lang="en-US" i="1">
+                              <a:latin typeface="Cambria Math" panose="02040503050406030204" pitchFamily="18" charset="0"/>
+                            </a:rPr>
+                            <m:t>𝑛</m:t>
+                          </m:r>
+                        </m:e>
+                        <m:sub>
+                          <m:r>
+                            <a:rPr lang="en-US" i="1">
+                              <a:latin typeface="Cambria Math" panose="02040503050406030204" pitchFamily="18" charset="0"/>
+                            </a:rPr>
+                            <m:t>𝑛</m:t>
+                          </m:r>
+                          <m:r>
+                            <a:rPr lang="en-US" i="1">
+                              <a:latin typeface="Cambria Math" panose="02040503050406030204" pitchFamily="18" charset="0"/>
+                            </a:rPr>
+                            <m:t>=1,…,</m:t>
+                          </m:r>
+                          <m:r>
+                            <a:rPr lang="en-US" i="1">
+                              <a:latin typeface="Cambria Math" panose="02040503050406030204" pitchFamily="18" charset="0"/>
+                            </a:rPr>
+                            <m:t>𝑁</m:t>
+                          </m:r>
+                        </m:sub>
+                      </m:sSub>
+                      <m:nary>
+                        <m:naryPr>
+                          <m:chr m:val="∑"/>
+                          <m:ctrlPr>
+                            <a:rPr lang="en-US" i="1">
+                              <a:latin typeface="Cambria Math" panose="02040503050406030204" pitchFamily="18" charset="0"/>
+                            </a:rPr>
+                          </m:ctrlPr>
+                        </m:naryPr>
+                        <m:sub>
+                          <m:r>
+                            <a:rPr lang="en-US" i="1">
+                              <a:latin typeface="Cambria Math" panose="02040503050406030204" pitchFamily="18" charset="0"/>
+                            </a:rPr>
+                            <m:t>𝑑</m:t>
+                          </m:r>
+                          <m:r>
+                            <a:rPr lang="en-US" i="1">
+                              <a:latin typeface="Cambria Math" panose="02040503050406030204" pitchFamily="18" charset="0"/>
+                            </a:rPr>
+                            <m:t>=1</m:t>
+                          </m:r>
+                        </m:sub>
+                        <m:sup>
+                          <m:r>
+                            <a:rPr lang="en-US" i="1">
+                              <a:latin typeface="Cambria Math" panose="02040503050406030204" pitchFamily="18" charset="0"/>
+                            </a:rPr>
+                            <m:t>𝐷</m:t>
+                          </m:r>
+                        </m:sup>
+                        <m:e>
+                          <m:sSup>
+                            <m:sSupPr>
+                              <m:ctrlPr>
+                                <a:rPr lang="en-US" i="1">
+                                  <a:latin typeface="Cambria Math" panose="02040503050406030204" pitchFamily="18" charset="0"/>
+                                </a:rPr>
+                              </m:ctrlPr>
+                            </m:sSupPr>
+                            <m:e>
+                              <m:d>
+                                <m:dPr>
+                                  <m:ctrlPr>
+                                    <a:rPr lang="en-US" i="1">
+                                      <a:latin typeface="Cambria Math" panose="02040503050406030204" pitchFamily="18" charset="0"/>
+                                    </a:rPr>
+                                  </m:ctrlPr>
+                                </m:dPr>
+                                <m:e>
+                                  <m:sSub>
+                                    <m:sSubPr>
+                                      <m:ctrlPr>
+                                        <a:rPr lang="en-US" i="1">
+                                          <a:latin typeface="Cambria Math" panose="02040503050406030204" pitchFamily="18" charset="0"/>
+                                        </a:rPr>
+                                      </m:ctrlPr>
+                                    </m:sSubPr>
+                                    <m:e>
+                                      <m:r>
+                                        <a:rPr lang="en-US" i="1">
+                                          <a:latin typeface="Cambria Math" panose="02040503050406030204" pitchFamily="18" charset="0"/>
+                                        </a:rPr>
+                                        <m:t>𝑥</m:t>
+                                      </m:r>
+                                    </m:e>
+                                    <m:sub>
+                                      <m:r>
+                                        <a:rPr lang="en-US" i="1">
+                                          <a:latin typeface="Cambria Math" panose="02040503050406030204" pitchFamily="18" charset="0"/>
+                                        </a:rPr>
+                                        <m:t>𝑑</m:t>
+                                      </m:r>
+                                    </m:sub>
+                                  </m:sSub>
+                                  <m:r>
+                                    <a:rPr lang="en-US" i="1">
+                                      <a:latin typeface="Cambria Math" panose="02040503050406030204" pitchFamily="18" charset="0"/>
+                                    </a:rPr>
+                                    <m:t>−</m:t>
+                                  </m:r>
+                                  <m:sSub>
+                                    <m:sSubPr>
+                                      <m:ctrlPr>
+                                        <a:rPr lang="en-US" i="1">
+                                          <a:latin typeface="Cambria Math" panose="02040503050406030204" pitchFamily="18" charset="0"/>
+                                        </a:rPr>
+                                      </m:ctrlPr>
+                                    </m:sSubPr>
+                                    <m:e>
+                                      <m:r>
+                                        <a:rPr lang="en-US" i="1">
+                                          <a:latin typeface="Cambria Math" panose="02040503050406030204" pitchFamily="18" charset="0"/>
+                                        </a:rPr>
+                                        <m:t>𝑥</m:t>
+                                      </m:r>
+                                    </m:e>
+                                    <m:sub>
+                                      <m:r>
+                                        <a:rPr lang="en-US" i="1">
+                                          <a:latin typeface="Cambria Math" panose="02040503050406030204" pitchFamily="18" charset="0"/>
+                                        </a:rPr>
+                                        <m:t>𝑛𝑑</m:t>
+                                      </m:r>
+                                    </m:sub>
+                                  </m:sSub>
+                                </m:e>
+                              </m:d>
+                            </m:e>
+                            <m:sup>
+                              <m:r>
+                                <a:rPr lang="en-US" i="1">
+                                  <a:latin typeface="Cambria Math" panose="02040503050406030204" pitchFamily="18" charset="0"/>
+                                </a:rPr>
+                                <m:t>2</m:t>
+                              </m:r>
+                            </m:sup>
+                          </m:sSup>
+                        </m:e>
+                      </m:nary>
+                    </m:oMath>
+                  </m:oMathPara>
+                </a14:m>
+                <a:endParaRPr lang="en-US" dirty="0"/>
+              </a:p>
+            </p:txBody>
+          </p:sp>
+        </mc:Choice>
+        <mc:Fallback>
+          <p:sp>
+            <p:nvSpPr>
+              <p:cNvPr id="3" name="Content Placeholder 2">
+                <a:extLst>
+                  <a:ext uri="{FF2B5EF4-FFF2-40B4-BE49-F238E27FC236}">
+                    <a16:creationId xmlns:a16="http://schemas.microsoft.com/office/drawing/2014/main" id="{CC18753D-B20E-721B-3C71-59E3ABF29640}"/>
+                  </a:ext>
+                </a:extLst>
+              </p:cNvPr>
+              <p:cNvSpPr>
+                <a:spLocks noGrp="1" noRot="1" noChangeAspect="1" noMove="1" noResize="1" noEditPoints="1" noAdjustHandles="1" noChangeArrowheads="1" noChangeShapeType="1" noTextEdit="1"/>
+              </p:cNvSpPr>
+              <p:nvPr>
+                <p:ph idx="1"/>
+              </p:nvPr>
+            </p:nvSpPr>
+            <p:spPr>
+              <a:blipFill>
+                <a:blip r:embed="rId2"/>
+                <a:stretch>
+                  <a:fillRect l="-1046" t="-1893"/>
+                </a:stretch>
+              </a:blipFill>
+            </p:spPr>
+            <p:txBody>
+              <a:bodyPr/>
+              <a:lstStyle/>
+              <a:p>
+                <a:r>
+                  <a:rPr lang="en-US">
+                    <a:noFill/>
+                  </a:rPr>
+                  <a:t> </a:t>
+                </a:r>
+              </a:p>
+            </p:txBody>
+          </p:sp>
+        </mc:Fallback>
+      </mc:AlternateContent>
     </p:spTree>
     <p:extLst>
       <p:ext uri="{BB962C8B-B14F-4D97-AF65-F5344CB8AC3E}">
-        <p14:creationId xmlns:p14="http://schemas.microsoft.com/office/powerpoint/2010/main" val="661806319"/>
+        <p14:creationId xmlns:p14="http://schemas.microsoft.com/office/powerpoint/2010/main" val="718905328"/>
       </p:ext>
     </p:extLst>
   </p:cSld>
@@ -13771,6 +14275,30 @@
 <file path=ppt/slides/slide18.xml><?xml version="1.0" encoding="utf-8"?>
 <p:sld xmlns:a="http://schemas.openxmlformats.org/drawingml/2006/main" xmlns:r="http://schemas.openxmlformats.org/officeDocument/2006/relationships" xmlns:p="http://schemas.openxmlformats.org/presentationml/2006/main">
   <p:cSld>
+    <p:bg>
+      <p:bgPr>
+        <a:blipFill>
+          <a:blip r:embed="rId2">
+            <a:duotone>
+              <a:schemeClr val="bg2">
+                <a:shade val="88000"/>
+                <a:hueMod val="106000"/>
+                <a:satMod val="140000"/>
+                <a:lumMod val="54000"/>
+              </a:schemeClr>
+              <a:schemeClr val="bg2">
+                <a:tint val="98000"/>
+                <a:hueMod val="90000"/>
+                <a:satMod val="150000"/>
+                <a:lumMod val="160000"/>
+              </a:schemeClr>
+            </a:duotone>
+          </a:blip>
+          <a:stretch/>
+        </a:blipFill>
+        <a:effectLst/>
+      </p:bgPr>
+    </p:bg>
     <p:spTree>
       <p:nvGrpSpPr>
         <p:cNvPr id="1" name=""/>
@@ -13790,7 +14318,7 @@
           <p:cNvPr id="2" name="Title 1">
             <a:extLst>
               <a:ext uri="{FF2B5EF4-FFF2-40B4-BE49-F238E27FC236}">
-                <a16:creationId xmlns:a16="http://schemas.microsoft.com/office/drawing/2014/main" id="{F13FAE68-28BD-FDB8-ECD4-42B0E540231D}"/>
+                <a16:creationId xmlns:a16="http://schemas.microsoft.com/office/drawing/2014/main" id="{F1235C8D-EC73-B481-04BB-5D4EDAF5F230}"/>
               </a:ext>
             </a:extLst>
           </p:cNvPr>
@@ -13801,24 +14329,171 @@
             <p:ph type="title"/>
           </p:nvPr>
         </p:nvSpPr>
-        <p:spPr/>
+        <p:spPr>
+          <a:xfrm>
+            <a:off x="6569957" y="618518"/>
+            <a:ext cx="4747088" cy="1478570"/>
+          </a:xfrm>
+        </p:spPr>
         <p:txBody>
-          <a:bodyPr/>
+          <a:bodyPr>
+            <a:normAutofit/>
+          </a:bodyPr>
           <a:lstStyle/>
           <a:p>
             <a:r>
-              <a:rPr lang="en-US" dirty="0"/>
-              <a:t>Method(Jim)</a:t>
+              <a:rPr lang="en-US" sz="3300"/>
+              <a:t>Experiment(Shafiullah)</a:t>
             </a:r>
           </a:p>
         </p:txBody>
       </p:sp>
+      <p:sp>
+        <p:nvSpPr>
+          <p:cNvPr id="12" name="Round Diagonal Corner Rectangle 9">
+            <a:extLst>
+              <a:ext uri="{FF2B5EF4-FFF2-40B4-BE49-F238E27FC236}">
+                <a16:creationId xmlns:a16="http://schemas.microsoft.com/office/drawing/2014/main" id="{A3D1FEF8-5149-4AC1-8D77-B256637FB797}"/>
+              </a:ext>
+              <a:ext uri="{C183D7F6-B498-43B3-948B-1728B52AA6E4}">
+                <adec:decorative xmlns:adec="http://schemas.microsoft.com/office/drawing/2017/decorative" val="1"/>
+              </a:ext>
+            </a:extLst>
+          </p:cNvPr>
+          <p:cNvSpPr>
+            <a:spLocks noGrp="1" noRot="1" noChangeAspect="1" noMove="1" noResize="1" noEditPoints="1" noAdjustHandles="1" noChangeArrowheads="1" noChangeShapeType="1" noTextEdit="1"/>
+          </p:cNvSpPr>
+          <p:nvPr>
+            <p:extLst>
+              <p:ext uri="{386F3935-93C4-4BCD-93E2-E3B085C9AB24}">
+                <p16:designElem xmlns:p16="http://schemas.microsoft.com/office/powerpoint/2015/main" val="1"/>
+              </p:ext>
+            </p:extLst>
+          </p:nvPr>
+        </p:nvSpPr>
+        <p:spPr>
+          <a:xfrm>
+            <a:off x="798950" y="808057"/>
+            <a:ext cx="5286376" cy="5234394"/>
+          </a:xfrm>
+          <a:prstGeom prst="round2DiagRect">
+            <a:avLst>
+              <a:gd name="adj1" fmla="val 7418"/>
+              <a:gd name="adj2" fmla="val 0"/>
+            </a:avLst>
+          </a:prstGeom>
+          <a:solidFill>
+            <a:srgbClr val="FFFFFF"/>
+          </a:solidFill>
+          <a:ln w="19050" cap="sq">
+            <a:solidFill>
+              <a:schemeClr val="tx2">
+                <a:lumMod val="60000"/>
+                <a:lumOff val="40000"/>
+                <a:alpha val="60000"/>
+              </a:schemeClr>
+            </a:solidFill>
+            <a:miter lim="800000"/>
+          </a:ln>
+          <a:effectLst>
+            <a:outerShdw blurRad="88900" dist="38100" dir="5400000" algn="t" rotWithShape="0">
+              <a:prstClr val="black">
+                <a:alpha val="40000"/>
+              </a:prstClr>
+            </a:outerShdw>
+          </a:effectLst>
+        </p:spPr>
+        <p:style>
+          <a:lnRef idx="2">
+            <a:schemeClr val="accent1">
+              <a:shade val="50000"/>
+            </a:schemeClr>
+          </a:lnRef>
+          <a:fillRef idx="1">
+            <a:schemeClr val="accent1"/>
+          </a:fillRef>
+          <a:effectRef idx="0">
+            <a:schemeClr val="accent1"/>
+          </a:effectRef>
+          <a:fontRef idx="minor">
+            <a:schemeClr val="lt1"/>
+          </a:fontRef>
+        </p:style>
+        <p:txBody>
+          <a:bodyPr rtlCol="0" anchor="ctr"/>
+          <a:lstStyle/>
+          <a:p>
+            <a:pPr algn="ctr"/>
+            <a:endParaRPr lang="en-US"/>
+          </a:p>
+        </p:txBody>
+      </p:sp>
+      <p:pic>
+        <p:nvPicPr>
+          <p:cNvPr id="5" name="Picture 4" descr="A graph with blue dots and a red line&#10;&#10;Description automatically generated with low confidence">
+            <a:extLst>
+              <a:ext uri="{FF2B5EF4-FFF2-40B4-BE49-F238E27FC236}">
+                <a16:creationId xmlns:a16="http://schemas.microsoft.com/office/drawing/2014/main" id="{97AD4FED-5CF0-1465-2480-DCBD76B4496E}"/>
+              </a:ext>
+            </a:extLst>
+          </p:cNvPr>
+          <p:cNvPicPr>
+            <a:picLocks noChangeAspect="1"/>
+          </p:cNvPicPr>
+          <p:nvPr/>
+        </p:nvPicPr>
+        <p:blipFill>
+          <a:blip r:embed="rId3"/>
+          <a:stretch>
+            <a:fillRect/>
+          </a:stretch>
+        </p:blipFill>
+        <p:spPr>
+          <a:xfrm>
+            <a:off x="2060786" y="1147146"/>
+            <a:ext cx="2751987" cy="2201590"/>
+          </a:xfrm>
+          <a:prstGeom prst="rect">
+            <a:avLst/>
+          </a:prstGeom>
+        </p:spPr>
+      </p:pic>
+      <p:pic>
+        <p:nvPicPr>
+          <p:cNvPr id="7" name="Picture 6" descr="A screenshot of a computer&#10;&#10;Description automatically generated with medium confidence">
+            <a:extLst>
+              <a:ext uri="{FF2B5EF4-FFF2-40B4-BE49-F238E27FC236}">
+                <a16:creationId xmlns:a16="http://schemas.microsoft.com/office/drawing/2014/main" id="{6D26CE9D-AF70-BC1F-5F88-BE1F1A41B300}"/>
+              </a:ext>
+            </a:extLst>
+          </p:cNvPr>
+          <p:cNvPicPr>
+            <a:picLocks noChangeAspect="1"/>
+          </p:cNvPicPr>
+          <p:nvPr/>
+        </p:nvPicPr>
+        <p:blipFill>
+          <a:blip r:embed="rId4"/>
+          <a:stretch>
+            <a:fillRect/>
+          </a:stretch>
+        </p:blipFill>
+        <p:spPr>
+          <a:xfrm>
+            <a:off x="1768907" y="3513327"/>
+            <a:ext cx="3335744" cy="2201591"/>
+          </a:xfrm>
+          <a:prstGeom prst="rect">
+            <a:avLst/>
+          </a:prstGeom>
+        </p:spPr>
+      </p:pic>
       <p:sp>
         <p:nvSpPr>
           <p:cNvPr id="3" name="Content Placeholder 2">
             <a:extLst>
               <a:ext uri="{FF2B5EF4-FFF2-40B4-BE49-F238E27FC236}">
-                <a16:creationId xmlns:a16="http://schemas.microsoft.com/office/drawing/2014/main" id="{865172AC-459B-C91B-696F-3B5B51FAC074}"/>
+                <a16:creationId xmlns:a16="http://schemas.microsoft.com/office/drawing/2014/main" id="{63499218-AB7A-6CD9-B957-0C9EE8B24E84}"/>
               </a:ext>
             </a:extLst>
           </p:cNvPr>
@@ -13829,61 +14504,35 @@
             <p:ph idx="1"/>
           </p:nvPr>
         </p:nvSpPr>
-        <p:spPr/>
+        <p:spPr>
+          <a:xfrm>
+            <a:off x="6569957" y="2249487"/>
+            <a:ext cx="4747087" cy="3541714"/>
+          </a:xfrm>
+        </p:spPr>
         <p:txBody>
-          <a:bodyPr/>
+          <a:bodyPr>
+            <a:normAutofit fontScale="70000" lnSpcReduction="20000"/>
+          </a:bodyPr>
           <a:lstStyle/>
           <a:p>
             <a:r>
               <a:rPr lang="en-US" dirty="0"/>
-              <a:t>We wanted to perform a deeper level of analysis beyond the original bar graphs. But the number of samples was an issue.</a:t>
+              <a:t>Based on the data sets, We have used linear regression to fit the model to explore the relationship between the female working participation and gender inequality. </a:t>
             </a:r>
           </a:p>
           <a:p>
             <a:r>
               <a:rPr lang="en-US" dirty="0"/>
-              <a:t>To try and combat this, we attempted to calculate the mean values for key features.</a:t>
+              <a:t>We used OLS to help us understand the relationship between GII and the country's GDP and make certain assumptions such as, "countries with high GDP have low GII and countries with low GDP have high GII." The OLS summary helps us analyze which variables are most likely to influence a country's GII.</a:t>
             </a:r>
-          </a:p>
-          <a:p>
-            <a:endParaRPr lang="en-US" dirty="0"/>
           </a:p>
         </p:txBody>
       </p:sp>
-      <p:pic>
-        <p:nvPicPr>
-          <p:cNvPr id="5" name="Picture 4">
-            <a:extLst>
-              <a:ext uri="{FF2B5EF4-FFF2-40B4-BE49-F238E27FC236}">
-                <a16:creationId xmlns:a16="http://schemas.microsoft.com/office/drawing/2014/main" id="{E153DA0A-1FA2-34AA-4D09-625511D2ABCA}"/>
-              </a:ext>
-            </a:extLst>
-          </p:cNvPr>
-          <p:cNvPicPr>
-            <a:picLocks noChangeAspect="1"/>
-          </p:cNvPicPr>
-          <p:nvPr/>
-        </p:nvPicPr>
-        <p:blipFill>
-          <a:blip r:embed="rId2"/>
-          <a:stretch>
-            <a:fillRect/>
-          </a:stretch>
-        </p:blipFill>
-        <p:spPr>
-          <a:xfrm>
-            <a:off x="2787036" y="3775067"/>
-            <a:ext cx="7039957" cy="1857634"/>
-          </a:xfrm>
-          <a:prstGeom prst="rect">
-            <a:avLst/>
-          </a:prstGeom>
-        </p:spPr>
-      </p:pic>
     </p:spTree>
     <p:extLst>
       <p:ext uri="{BB962C8B-B14F-4D97-AF65-F5344CB8AC3E}">
-        <p14:creationId xmlns:p14="http://schemas.microsoft.com/office/powerpoint/2010/main" val="747518340"/>
+        <p14:creationId xmlns:p14="http://schemas.microsoft.com/office/powerpoint/2010/main" val="3601133287"/>
       </p:ext>
     </p:extLst>
   </p:cSld>
@@ -13915,7 +14564,7 @@
           <p:cNvPr id="2" name="Title 1">
             <a:extLst>
               <a:ext uri="{FF2B5EF4-FFF2-40B4-BE49-F238E27FC236}">
-                <a16:creationId xmlns:a16="http://schemas.microsoft.com/office/drawing/2014/main" id="{44A48827-5D45-76EC-8FD8-E8465F6D7385}"/>
+                <a16:creationId xmlns:a16="http://schemas.microsoft.com/office/drawing/2014/main" id="{96749225-E935-9376-C57C-847103FDD8AA}"/>
               </a:ext>
             </a:extLst>
           </p:cNvPr>
@@ -13933,15 +14582,7 @@
           <a:p>
             <a:r>
               <a:rPr lang="en-US" dirty="0"/>
-              <a:t>Method(</a:t>
-            </a:r>
-            <a:r>
-              <a:rPr lang="en-US" dirty="0" err="1"/>
-              <a:t>jim</a:t>
-            </a:r>
-            <a:r>
-              <a:rPr lang="en-US" dirty="0"/>
-              <a:t>)</a:t>
+              <a:t>Experiment 2 </a:t>
             </a:r>
           </a:p>
         </p:txBody>
@@ -13951,7 +14592,7 @@
           <p:cNvPr id="3" name="Content Placeholder 2">
             <a:extLst>
               <a:ext uri="{FF2B5EF4-FFF2-40B4-BE49-F238E27FC236}">
-                <a16:creationId xmlns:a16="http://schemas.microsoft.com/office/drawing/2014/main" id="{2BACA287-5EAA-3A76-F9D8-FCDB4A0AF750}"/>
+                <a16:creationId xmlns:a16="http://schemas.microsoft.com/office/drawing/2014/main" id="{FDD51454-069C-774E-F483-2048F36711E3}"/>
               </a:ext>
             </a:extLst>
           </p:cNvPr>
@@ -13969,42 +14610,60 @@
           <a:p>
             <a:r>
               <a:rPr lang="en-US" dirty="0"/>
-              <a:t>Next up, Levels FYI.</a:t>
+              <a:t>KNN lead to this:</a:t>
             </a:r>
+          </a:p>
+          <a:p>
+            <a:endParaRPr lang="en-US" dirty="0"/>
           </a:p>
           <a:p>
             <a:r>
               <a:rPr lang="en-US" dirty="0"/>
-              <a:t>This data set had substantially more data.</a:t>
+              <a:t>The goal was to get some more insight about pay gap discrepancies between women and men based on feature selection, and to identify the more important variables that would affect the wage gap. </a:t>
             </a:r>
           </a:p>
           <a:p>
             <a:r>
               <a:rPr lang="en-US" dirty="0"/>
-              <a:t>Similar to Chris, I performed linear regression analysis.</a:t>
-            </a:r>
-          </a:p>
-          <a:p>
-            <a:pPr lvl="1"/>
-            <a:r>
-              <a:rPr lang="en-US" dirty="0"/>
-              <a:t>The main difference here is that I used the </a:t>
-            </a:r>
-            <a:r>
-              <a:rPr lang="en-US" dirty="0" err="1"/>
-              <a:t>Sklearn</a:t>
-            </a:r>
-            <a:r>
-              <a:rPr lang="en-US" dirty="0"/>
-              <a:t>(scikit-learn) library.</a:t>
+              <a:t>The result indicates that the accuracy, macro, and micro accuracy are sufficient. </a:t>
             </a:r>
           </a:p>
         </p:txBody>
       </p:sp>
+      <p:pic>
+        <p:nvPicPr>
+          <p:cNvPr id="5" name="Picture 4" descr="A picture containing text, font, screenshot&#10;&#10;Description automatically generated">
+            <a:extLst>
+              <a:ext uri="{FF2B5EF4-FFF2-40B4-BE49-F238E27FC236}">
+                <a16:creationId xmlns:a16="http://schemas.microsoft.com/office/drawing/2014/main" id="{3CFAF2C7-230A-951D-BF8F-1DA0759AD5DC}"/>
+              </a:ext>
+            </a:extLst>
+          </p:cNvPr>
+          <p:cNvPicPr>
+            <a:picLocks noChangeAspect="1"/>
+          </p:cNvPicPr>
+          <p:nvPr/>
+        </p:nvPicPr>
+        <p:blipFill>
+          <a:blip r:embed="rId2"/>
+          <a:stretch>
+            <a:fillRect/>
+          </a:stretch>
+        </p:blipFill>
+        <p:spPr>
+          <a:xfrm>
+            <a:off x="1348984" y="2714525"/>
+            <a:ext cx="1762371" cy="714475"/>
+          </a:xfrm>
+          <a:prstGeom prst="rect">
+            <a:avLst/>
+          </a:prstGeom>
+        </p:spPr>
+      </p:pic>
     </p:spTree>
     <p:extLst>
       <p:ext uri="{BB962C8B-B14F-4D97-AF65-F5344CB8AC3E}">
-        <p14:creationId xmlns:p14="http://schemas.microsoft.com/office/powerpoint/2010/main" val="2975576823"/>
+        <p14:creationId xmlns:p14="http://schemas.microsoft.com/office/powerpoint/2010/main" val="3841716735"/>
       </p:ext>
     </p:extLst>
   </p:cSld>
@@ -14126,6 +14785,350 @@
 </file>
 
 <file path=ppt/slides/slide20.xml><?xml version="1.0" encoding="utf-8"?>
+<p:sld xmlns:a="http://schemas.openxmlformats.org/drawingml/2006/main" xmlns:r="http://schemas.openxmlformats.org/officeDocument/2006/relationships" xmlns:p="http://schemas.openxmlformats.org/presentationml/2006/main">
+  <p:cSld>
+    <p:spTree>
+      <p:nvGrpSpPr>
+        <p:cNvPr id="1" name=""/>
+        <p:cNvGrpSpPr/>
+        <p:nvPr/>
+      </p:nvGrpSpPr>
+      <p:grpSpPr>
+        <a:xfrm>
+          <a:off x="0" y="0"/>
+          <a:ext cx="0" cy="0"/>
+          <a:chOff x="0" y="0"/>
+          <a:chExt cx="0" cy="0"/>
+        </a:xfrm>
+      </p:grpSpPr>
+      <p:sp>
+        <p:nvSpPr>
+          <p:cNvPr id="2" name="Title 1">
+            <a:extLst>
+              <a:ext uri="{FF2B5EF4-FFF2-40B4-BE49-F238E27FC236}">
+                <a16:creationId xmlns:a16="http://schemas.microsoft.com/office/drawing/2014/main" id="{F13FAE68-28BD-FDB8-ECD4-42B0E540231D}"/>
+              </a:ext>
+            </a:extLst>
+          </p:cNvPr>
+          <p:cNvSpPr>
+            <a:spLocks noGrp="1"/>
+          </p:cNvSpPr>
+          <p:nvPr>
+            <p:ph type="title"/>
+          </p:nvPr>
+        </p:nvSpPr>
+        <p:spPr/>
+        <p:txBody>
+          <a:bodyPr/>
+          <a:lstStyle/>
+          <a:p>
+            <a:r>
+              <a:rPr lang="en-US" dirty="0"/>
+              <a:t>Method(Jim)</a:t>
+            </a:r>
+          </a:p>
+        </p:txBody>
+      </p:sp>
+      <p:sp>
+        <p:nvSpPr>
+          <p:cNvPr id="3" name="Content Placeholder 2">
+            <a:extLst>
+              <a:ext uri="{FF2B5EF4-FFF2-40B4-BE49-F238E27FC236}">
+                <a16:creationId xmlns:a16="http://schemas.microsoft.com/office/drawing/2014/main" id="{865172AC-459B-C91B-696F-3B5B51FAC074}"/>
+              </a:ext>
+            </a:extLst>
+          </p:cNvPr>
+          <p:cNvSpPr>
+            <a:spLocks noGrp="1"/>
+          </p:cNvSpPr>
+          <p:nvPr>
+            <p:ph idx="1"/>
+          </p:nvPr>
+        </p:nvSpPr>
+        <p:spPr/>
+        <p:txBody>
+          <a:bodyPr/>
+          <a:lstStyle/>
+          <a:p>
+            <a:r>
+              <a:rPr lang="en-US" dirty="0"/>
+              <a:t>Similar to Chris, I analyzed two data sets.</a:t>
+            </a:r>
+          </a:p>
+          <a:p>
+            <a:r>
+              <a:rPr lang="en-US" dirty="0"/>
+              <a:t>The first was simulated data set from Human Resources Diversity Analysis.</a:t>
+            </a:r>
+          </a:p>
+          <a:p>
+            <a:r>
+              <a:rPr lang="en-US" dirty="0"/>
+              <a:t>The second was from Levels FYI.</a:t>
+            </a:r>
+          </a:p>
+        </p:txBody>
+      </p:sp>
+    </p:spTree>
+    <p:extLst>
+      <p:ext uri="{BB962C8B-B14F-4D97-AF65-F5344CB8AC3E}">
+        <p14:creationId xmlns:p14="http://schemas.microsoft.com/office/powerpoint/2010/main" val="661806319"/>
+      </p:ext>
+    </p:extLst>
+  </p:cSld>
+  <p:clrMapOvr>
+    <a:masterClrMapping/>
+  </p:clrMapOvr>
+</p:sld>
+</file>
+
+<file path=ppt/slides/slide21.xml><?xml version="1.0" encoding="utf-8"?>
+<p:sld xmlns:a="http://schemas.openxmlformats.org/drawingml/2006/main" xmlns:r="http://schemas.openxmlformats.org/officeDocument/2006/relationships" xmlns:p="http://schemas.openxmlformats.org/presentationml/2006/main">
+  <p:cSld>
+    <p:spTree>
+      <p:nvGrpSpPr>
+        <p:cNvPr id="1" name=""/>
+        <p:cNvGrpSpPr/>
+        <p:nvPr/>
+      </p:nvGrpSpPr>
+      <p:grpSpPr>
+        <a:xfrm>
+          <a:off x="0" y="0"/>
+          <a:ext cx="0" cy="0"/>
+          <a:chOff x="0" y="0"/>
+          <a:chExt cx="0" cy="0"/>
+        </a:xfrm>
+      </p:grpSpPr>
+      <p:sp>
+        <p:nvSpPr>
+          <p:cNvPr id="2" name="Title 1">
+            <a:extLst>
+              <a:ext uri="{FF2B5EF4-FFF2-40B4-BE49-F238E27FC236}">
+                <a16:creationId xmlns:a16="http://schemas.microsoft.com/office/drawing/2014/main" id="{F13FAE68-28BD-FDB8-ECD4-42B0E540231D}"/>
+              </a:ext>
+            </a:extLst>
+          </p:cNvPr>
+          <p:cNvSpPr>
+            <a:spLocks noGrp="1"/>
+          </p:cNvSpPr>
+          <p:nvPr>
+            <p:ph type="title"/>
+          </p:nvPr>
+        </p:nvSpPr>
+        <p:spPr/>
+        <p:txBody>
+          <a:bodyPr/>
+          <a:lstStyle/>
+          <a:p>
+            <a:r>
+              <a:rPr lang="en-US" dirty="0"/>
+              <a:t>Method(Jim)</a:t>
+            </a:r>
+          </a:p>
+        </p:txBody>
+      </p:sp>
+      <p:sp>
+        <p:nvSpPr>
+          <p:cNvPr id="3" name="Content Placeholder 2">
+            <a:extLst>
+              <a:ext uri="{FF2B5EF4-FFF2-40B4-BE49-F238E27FC236}">
+                <a16:creationId xmlns:a16="http://schemas.microsoft.com/office/drawing/2014/main" id="{865172AC-459B-C91B-696F-3B5B51FAC074}"/>
+              </a:ext>
+            </a:extLst>
+          </p:cNvPr>
+          <p:cNvSpPr>
+            <a:spLocks noGrp="1"/>
+          </p:cNvSpPr>
+          <p:nvPr>
+            <p:ph idx="1"/>
+          </p:nvPr>
+        </p:nvSpPr>
+        <p:spPr/>
+        <p:txBody>
+          <a:bodyPr/>
+          <a:lstStyle/>
+          <a:p>
+            <a:r>
+              <a:rPr lang="en-US" dirty="0"/>
+              <a:t>We wanted to perform a deeper level of analysis beyond the original bar graphs. But the number of samples was an issue.</a:t>
+            </a:r>
+          </a:p>
+          <a:p>
+            <a:r>
+              <a:rPr lang="en-US" dirty="0"/>
+              <a:t>To try and combat this, we attempted to calculate the mean values for key features.</a:t>
+            </a:r>
+          </a:p>
+          <a:p>
+            <a:endParaRPr lang="en-US" dirty="0"/>
+          </a:p>
+        </p:txBody>
+      </p:sp>
+      <p:pic>
+        <p:nvPicPr>
+          <p:cNvPr id="5" name="Picture 4">
+            <a:extLst>
+              <a:ext uri="{FF2B5EF4-FFF2-40B4-BE49-F238E27FC236}">
+                <a16:creationId xmlns:a16="http://schemas.microsoft.com/office/drawing/2014/main" id="{E153DA0A-1FA2-34AA-4D09-625511D2ABCA}"/>
+              </a:ext>
+            </a:extLst>
+          </p:cNvPr>
+          <p:cNvPicPr>
+            <a:picLocks noChangeAspect="1"/>
+          </p:cNvPicPr>
+          <p:nvPr/>
+        </p:nvPicPr>
+        <p:blipFill>
+          <a:blip r:embed="rId2"/>
+          <a:stretch>
+            <a:fillRect/>
+          </a:stretch>
+        </p:blipFill>
+        <p:spPr>
+          <a:xfrm>
+            <a:off x="2787036" y="3775067"/>
+            <a:ext cx="7039957" cy="1857634"/>
+          </a:xfrm>
+          <a:prstGeom prst="rect">
+            <a:avLst/>
+          </a:prstGeom>
+        </p:spPr>
+      </p:pic>
+    </p:spTree>
+    <p:extLst>
+      <p:ext uri="{BB962C8B-B14F-4D97-AF65-F5344CB8AC3E}">
+        <p14:creationId xmlns:p14="http://schemas.microsoft.com/office/powerpoint/2010/main" val="747518340"/>
+      </p:ext>
+    </p:extLst>
+  </p:cSld>
+  <p:clrMapOvr>
+    <a:masterClrMapping/>
+  </p:clrMapOvr>
+</p:sld>
+</file>
+
+<file path=ppt/slides/slide22.xml><?xml version="1.0" encoding="utf-8"?>
+<p:sld xmlns:a="http://schemas.openxmlformats.org/drawingml/2006/main" xmlns:r="http://schemas.openxmlformats.org/officeDocument/2006/relationships" xmlns:p="http://schemas.openxmlformats.org/presentationml/2006/main">
+  <p:cSld>
+    <p:spTree>
+      <p:nvGrpSpPr>
+        <p:cNvPr id="1" name=""/>
+        <p:cNvGrpSpPr/>
+        <p:nvPr/>
+      </p:nvGrpSpPr>
+      <p:grpSpPr>
+        <a:xfrm>
+          <a:off x="0" y="0"/>
+          <a:ext cx="0" cy="0"/>
+          <a:chOff x="0" y="0"/>
+          <a:chExt cx="0" cy="0"/>
+        </a:xfrm>
+      </p:grpSpPr>
+      <p:sp>
+        <p:nvSpPr>
+          <p:cNvPr id="2" name="Title 1">
+            <a:extLst>
+              <a:ext uri="{FF2B5EF4-FFF2-40B4-BE49-F238E27FC236}">
+                <a16:creationId xmlns:a16="http://schemas.microsoft.com/office/drawing/2014/main" id="{44A48827-5D45-76EC-8FD8-E8465F6D7385}"/>
+              </a:ext>
+            </a:extLst>
+          </p:cNvPr>
+          <p:cNvSpPr>
+            <a:spLocks noGrp="1"/>
+          </p:cNvSpPr>
+          <p:nvPr>
+            <p:ph type="title"/>
+          </p:nvPr>
+        </p:nvSpPr>
+        <p:spPr/>
+        <p:txBody>
+          <a:bodyPr/>
+          <a:lstStyle/>
+          <a:p>
+            <a:r>
+              <a:rPr lang="en-US" dirty="0"/>
+              <a:t>Method(</a:t>
+            </a:r>
+            <a:r>
+              <a:rPr lang="en-US" dirty="0" err="1"/>
+              <a:t>jim</a:t>
+            </a:r>
+            <a:r>
+              <a:rPr lang="en-US" dirty="0"/>
+              <a:t>)</a:t>
+            </a:r>
+          </a:p>
+        </p:txBody>
+      </p:sp>
+      <p:sp>
+        <p:nvSpPr>
+          <p:cNvPr id="3" name="Content Placeholder 2">
+            <a:extLst>
+              <a:ext uri="{FF2B5EF4-FFF2-40B4-BE49-F238E27FC236}">
+                <a16:creationId xmlns:a16="http://schemas.microsoft.com/office/drawing/2014/main" id="{2BACA287-5EAA-3A76-F9D8-FCDB4A0AF750}"/>
+              </a:ext>
+            </a:extLst>
+          </p:cNvPr>
+          <p:cNvSpPr>
+            <a:spLocks noGrp="1"/>
+          </p:cNvSpPr>
+          <p:nvPr>
+            <p:ph idx="1"/>
+          </p:nvPr>
+        </p:nvSpPr>
+        <p:spPr/>
+        <p:txBody>
+          <a:bodyPr/>
+          <a:lstStyle/>
+          <a:p>
+            <a:r>
+              <a:rPr lang="en-US" dirty="0"/>
+              <a:t>Next up, Levels FYI.</a:t>
+            </a:r>
+          </a:p>
+          <a:p>
+            <a:r>
+              <a:rPr lang="en-US" dirty="0"/>
+              <a:t>This data set had substantially more data.</a:t>
+            </a:r>
+          </a:p>
+          <a:p>
+            <a:r>
+              <a:rPr lang="en-US" dirty="0"/>
+              <a:t>Similar to Chris, I performed linear regression analysis.</a:t>
+            </a:r>
+          </a:p>
+          <a:p>
+            <a:pPr lvl="1"/>
+            <a:r>
+              <a:rPr lang="en-US" dirty="0"/>
+              <a:t>The main difference here is that I used the </a:t>
+            </a:r>
+            <a:r>
+              <a:rPr lang="en-US" dirty="0" err="1"/>
+              <a:t>Sklearn</a:t>
+            </a:r>
+            <a:r>
+              <a:rPr lang="en-US" dirty="0"/>
+              <a:t>(scikit-learn) library.</a:t>
+            </a:r>
+          </a:p>
+        </p:txBody>
+      </p:sp>
+    </p:spTree>
+    <p:extLst>
+      <p:ext uri="{BB962C8B-B14F-4D97-AF65-F5344CB8AC3E}">
+        <p14:creationId xmlns:p14="http://schemas.microsoft.com/office/powerpoint/2010/main" val="2975576823"/>
+      </p:ext>
+    </p:extLst>
+  </p:cSld>
+  <p:clrMapOvr>
+    <a:masterClrMapping/>
+  </p:clrMapOvr>
+</p:sld>
+</file>
+
+<file path=ppt/slides/slide23.xml><?xml version="1.0" encoding="utf-8"?>
 <p:sld xmlns:a="http://schemas.openxmlformats.org/drawingml/2006/main" xmlns:r="http://schemas.openxmlformats.org/officeDocument/2006/relationships" xmlns:p="http://schemas.openxmlformats.org/presentationml/2006/main">
   <p:cSld>
     <p:spTree>
@@ -14250,7 +15253,7 @@
 </p:sld>
 </file>
 
-<file path=ppt/slides/slide21.xml><?xml version="1.0" encoding="utf-8"?>
+<file path=ppt/slides/slide24.xml><?xml version="1.0" encoding="utf-8"?>
 <p:sld xmlns:a="http://schemas.openxmlformats.org/drawingml/2006/main" xmlns:r="http://schemas.openxmlformats.org/officeDocument/2006/relationships" xmlns:p="http://schemas.openxmlformats.org/presentationml/2006/main">
   <p:cSld>
     <p:spTree>
@@ -14376,7 +15379,7 @@
 </p:sld>
 </file>
 
-<file path=ppt/slides/slide22.xml><?xml version="1.0" encoding="utf-8"?>
+<file path=ppt/slides/slide25.xml><?xml version="1.0" encoding="utf-8"?>
 <p:sld xmlns:a="http://schemas.openxmlformats.org/drawingml/2006/main" xmlns:r="http://schemas.openxmlformats.org/officeDocument/2006/relationships" xmlns:p="http://schemas.openxmlformats.org/presentationml/2006/main">
   <p:cSld>
     <p:spTree>
@@ -14498,7 +15501,7 @@
 </p:sld>
 </file>
 
-<file path=ppt/slides/slide23.xml><?xml version="1.0" encoding="utf-8"?>
+<file path=ppt/slides/slide26.xml><?xml version="1.0" encoding="utf-8"?>
 <p:sld xmlns:a="http://schemas.openxmlformats.org/drawingml/2006/main" xmlns:r="http://schemas.openxmlformats.org/officeDocument/2006/relationships" xmlns:p="http://schemas.openxmlformats.org/presentationml/2006/main">
   <p:cSld>
     <p:spTree>

</xml_diff>